<commit_message>
Add Re = 10 for ramp
</commit_message>
<xml_diff>
--- a/power_point.pptx
+++ b/power_point.pptx
@@ -5,10 +5,10 @@
     <p:sldMasterId id="2147483666" r:id="rId4"/>
   </p:sldMasterIdLst>
   <p:notesMasterIdLst>
-    <p:notesMasterId r:id="rId19"/>
+    <p:notesMasterId r:id="rId25"/>
   </p:notesMasterIdLst>
   <p:handoutMasterIdLst>
-    <p:handoutMasterId r:id="rId20"/>
+    <p:handoutMasterId r:id="rId26"/>
   </p:handoutMasterIdLst>
   <p:sldIdLst>
     <p:sldId id="256" r:id="rId5"/>
@@ -24,7 +24,13 @@
     <p:sldId id="299" r:id="rId15"/>
     <p:sldId id="300" r:id="rId16"/>
     <p:sldId id="301" r:id="rId17"/>
-    <p:sldId id="304" r:id="rId18"/>
+    <p:sldId id="307" r:id="rId18"/>
+    <p:sldId id="308" r:id="rId19"/>
+    <p:sldId id="309" r:id="rId20"/>
+    <p:sldId id="304" r:id="rId21"/>
+    <p:sldId id="306" r:id="rId22"/>
+    <p:sldId id="310" r:id="rId23"/>
+    <p:sldId id="311" r:id="rId24"/>
   </p:sldIdLst>
   <p:sldSz cx="12192000" cy="6858000"/>
   <p:notesSz cx="6858000" cy="9144000"/>
@@ -17686,6 +17692,10 @@
               <a:rPr lang="en-GB" dirty="0"/>
               <a:t>Miani Giorgio</a:t>
             </a:r>
+          </a:p>
+          <a:p>
+            <a:pPr rtl="0"/>
+            <a:endParaRPr lang="en-GB" dirty="0"/>
           </a:p>
         </p:txBody>
       </p:sp>
@@ -20869,7 +20879,7 @@
           <p:cNvPr id="4" name="Segnaposto data 3">
             <a:extLst>
               <a:ext uri="{FF2B5EF4-FFF2-40B4-BE49-F238E27FC236}">
-                <a16:creationId xmlns:a16="http://schemas.microsoft.com/office/drawing/2014/main" id="{88601A50-C21D-FFDC-8C81-56C44B664418}"/>
+                <a16:creationId xmlns:a16="http://schemas.microsoft.com/office/drawing/2014/main" id="{8DC882A0-BF15-E82F-30F1-186F1BD24316}"/>
               </a:ext>
             </a:extLst>
           </p:cNvPr>
@@ -20898,7 +20908,7 @@
           <p:cNvPr id="5" name="Segnaposto piè di pagina 4">
             <a:extLst>
               <a:ext uri="{FF2B5EF4-FFF2-40B4-BE49-F238E27FC236}">
-                <a16:creationId xmlns:a16="http://schemas.microsoft.com/office/drawing/2014/main" id="{3D5701C5-8CD1-AF76-0A50-6B7DB4F0DFF6}"/>
+                <a16:creationId xmlns:a16="http://schemas.microsoft.com/office/drawing/2014/main" id="{7F38276F-5FC8-6D52-B340-FD47DBF52E2D}"/>
               </a:ext>
             </a:extLst>
           </p:cNvPr>
@@ -20927,7 +20937,7 @@
           <p:cNvPr id="6" name="Segnaposto numero diapositiva 5">
             <a:extLst>
               <a:ext uri="{FF2B5EF4-FFF2-40B4-BE49-F238E27FC236}">
-                <a16:creationId xmlns:a16="http://schemas.microsoft.com/office/drawing/2014/main" id="{8DDEE7C3-F034-357E-CEEE-BDA834C92156}"/>
+                <a16:creationId xmlns:a16="http://schemas.microsoft.com/office/drawing/2014/main" id="{28C708BB-EF0F-F765-244F-C533C669922E}"/>
               </a:ext>
             </a:extLst>
           </p:cNvPr>
@@ -20952,10 +20962,993 @@
           </a:p>
         </p:txBody>
       </p:sp>
+      <p:sp>
+        <p:nvSpPr>
+          <p:cNvPr id="7" name="CasellaDiTesto 6">
+            <a:extLst>
+              <a:ext uri="{FF2B5EF4-FFF2-40B4-BE49-F238E27FC236}">
+                <a16:creationId xmlns:a16="http://schemas.microsoft.com/office/drawing/2014/main" id="{E8ED9AD6-2A82-31A4-E425-866A12851EA3}"/>
+              </a:ext>
+            </a:extLst>
+          </p:cNvPr>
+          <p:cNvSpPr txBox="1"/>
+          <p:nvPr/>
+        </p:nvSpPr>
+        <p:spPr>
+          <a:xfrm>
+            <a:off x="2121763" y="266330"/>
+            <a:ext cx="8664606" cy="646331"/>
+          </a:xfrm>
+          <a:prstGeom prst="rect">
+            <a:avLst/>
+          </a:prstGeom>
+          <a:noFill/>
+        </p:spPr>
+        <p:txBody>
+          <a:bodyPr wrap="square" rtlCol="0">
+            <a:spAutoFit/>
+          </a:bodyPr>
+          <a:lstStyle/>
+          <a:p>
+            <a:r>
+              <a:rPr lang="it-IT" sz="3600" dirty="0"/>
+              <a:t>Time vs Reynolds for </a:t>
+            </a:r>
+            <a:r>
+              <a:rPr lang="it-IT" sz="3600" dirty="0" err="1"/>
+              <a:t>different</a:t>
+            </a:r>
+            <a:r>
+              <a:rPr lang="it-IT" sz="3600" dirty="0"/>
+              <a:t> meshes</a:t>
+            </a:r>
+            <a:endParaRPr lang="en-GB" sz="3600" dirty="0"/>
+          </a:p>
+        </p:txBody>
+      </p:sp>
+    </p:spTree>
+    <p:extLst>
+      <p:ext uri="{BB962C8B-B14F-4D97-AF65-F5344CB8AC3E}">
+        <p14:creationId xmlns:p14="http://schemas.microsoft.com/office/powerpoint/2010/main" val="4041731603"/>
+      </p:ext>
+    </p:extLst>
+  </p:cSld>
+  <p:clrMapOvr>
+    <a:masterClrMapping/>
+  </p:clrMapOvr>
+</p:sld>
+</file>
+
+<file path=ppt/slides/slide15.xml><?xml version="1.0" encoding="utf-8"?>
+<p:sld xmlns:a="http://schemas.openxmlformats.org/drawingml/2006/main" xmlns:r="http://schemas.openxmlformats.org/officeDocument/2006/relationships" xmlns:p="http://schemas.openxmlformats.org/presentationml/2006/main">
+  <p:cSld>
+    <p:spTree>
+      <p:nvGrpSpPr>
+        <p:cNvPr id="1" name=""/>
+        <p:cNvGrpSpPr/>
+        <p:nvPr/>
+      </p:nvGrpSpPr>
+      <p:grpSpPr>
+        <a:xfrm>
+          <a:off x="0" y="0"/>
+          <a:ext cx="0" cy="0"/>
+          <a:chOff x="0" y="0"/>
+          <a:chExt cx="0" cy="0"/>
+        </a:xfrm>
+      </p:grpSpPr>
+      <p:sp>
+        <p:nvSpPr>
+          <p:cNvPr id="4" name="Segnaposto data 3">
+            <a:extLst>
+              <a:ext uri="{FF2B5EF4-FFF2-40B4-BE49-F238E27FC236}">
+                <a16:creationId xmlns:a16="http://schemas.microsoft.com/office/drawing/2014/main" id="{7E845C14-E719-17BE-1ACF-A098CB7F936B}"/>
+              </a:ext>
+            </a:extLst>
+          </p:cNvPr>
+          <p:cNvSpPr>
+            <a:spLocks noGrp="1"/>
+          </p:cNvSpPr>
+          <p:nvPr>
+            <p:ph type="dt" sz="half" idx="10"/>
+          </p:nvPr>
+        </p:nvSpPr>
+        <p:spPr/>
+        <p:txBody>
+          <a:bodyPr/>
+          <a:lstStyle/>
+          <a:p>
+            <a:pPr rtl="0"/>
+            <a:r>
+              <a:rPr lang="en-GB" noProof="0"/>
+              <a:t>20XX</a:t>
+            </a:r>
+          </a:p>
+        </p:txBody>
+      </p:sp>
+      <p:sp>
+        <p:nvSpPr>
+          <p:cNvPr id="5" name="Segnaposto piè di pagina 4">
+            <a:extLst>
+              <a:ext uri="{FF2B5EF4-FFF2-40B4-BE49-F238E27FC236}">
+                <a16:creationId xmlns:a16="http://schemas.microsoft.com/office/drawing/2014/main" id="{4ECB99DB-9014-4E11-54D9-FB8DA295B998}"/>
+              </a:ext>
+            </a:extLst>
+          </p:cNvPr>
+          <p:cNvSpPr>
+            <a:spLocks noGrp="1"/>
+          </p:cNvSpPr>
+          <p:nvPr>
+            <p:ph type="ftr" sz="quarter" idx="11"/>
+          </p:nvPr>
+        </p:nvSpPr>
+        <p:spPr/>
+        <p:txBody>
+          <a:bodyPr/>
+          <a:lstStyle/>
+          <a:p>
+            <a:pPr rtl="0"/>
+            <a:r>
+              <a:rPr lang="en-GB" noProof="0"/>
+              <a:t>Pitch Deck</a:t>
+            </a:r>
+          </a:p>
+        </p:txBody>
+      </p:sp>
+      <p:sp>
+        <p:nvSpPr>
+          <p:cNvPr id="6" name="Segnaposto numero diapositiva 5">
+            <a:extLst>
+              <a:ext uri="{FF2B5EF4-FFF2-40B4-BE49-F238E27FC236}">
+                <a16:creationId xmlns:a16="http://schemas.microsoft.com/office/drawing/2014/main" id="{84D8F743-CA8C-EB1A-700F-7D3CA3DA12CD}"/>
+              </a:ext>
+            </a:extLst>
+          </p:cNvPr>
+          <p:cNvSpPr>
+            <a:spLocks noGrp="1"/>
+          </p:cNvSpPr>
+          <p:nvPr>
+            <p:ph type="sldNum" sz="quarter" idx="12"/>
+          </p:nvPr>
+        </p:nvSpPr>
+        <p:spPr/>
+        <p:txBody>
+          <a:bodyPr/>
+          <a:lstStyle/>
+          <a:p>
+            <a:pPr rtl="0"/>
+            <a:fld id="{B5CEABB6-07DC-46E8-9B57-56EC44A396E5}" type="slidenum">
+              <a:rPr lang="en-GB" noProof="0" smtClean="0"/>
+              <a:t>15</a:t>
+            </a:fld>
+            <a:endParaRPr lang="en-GB" noProof="0"/>
+          </a:p>
+        </p:txBody>
+      </p:sp>
+      <mc:AlternateContent xmlns:mc="http://schemas.openxmlformats.org/markup-compatibility/2006">
+        <mc:Choice xmlns:a14="http://schemas.microsoft.com/office/drawing/2010/main" Requires="a14">
+          <p:sp>
+            <p:nvSpPr>
+              <p:cNvPr id="8" name="CasellaDiTesto 7">
+                <a:extLst>
+                  <a:ext uri="{FF2B5EF4-FFF2-40B4-BE49-F238E27FC236}">
+                    <a16:creationId xmlns:a16="http://schemas.microsoft.com/office/drawing/2014/main" id="{46BF0F23-5451-B192-5993-4E046627416A}"/>
+                  </a:ext>
+                </a:extLst>
+              </p:cNvPr>
+              <p:cNvSpPr txBox="1"/>
+              <p:nvPr/>
+            </p:nvSpPr>
+            <p:spPr>
+              <a:xfrm>
+                <a:off x="1589103" y="470517"/>
+                <a:ext cx="8549195" cy="646331"/>
+              </a:xfrm>
+              <a:prstGeom prst="rect">
+                <a:avLst/>
+              </a:prstGeom>
+              <a:noFill/>
+            </p:spPr>
+            <p:txBody>
+              <a:bodyPr wrap="square">
+                <a:spAutoFit/>
+              </a:bodyPr>
+              <a:lstStyle/>
+              <a:p>
+                <a:r>
+                  <a:rPr lang="it-IT" sz="3600" dirty="0"/>
+                  <a:t>Time vs </a:t>
+                </a:r>
+                <a14:m>
+                  <m:oMath xmlns:m="http://schemas.openxmlformats.org/officeDocument/2006/math">
+                    <m:r>
+                      <a:rPr lang="it-IT" sz="3600" i="1" smtClean="0">
+                        <a:latin typeface="Cambria Math" panose="02040503050406030204" pitchFamily="18" charset="0"/>
+                        <a:ea typeface="Cambria Math" panose="02040503050406030204" pitchFamily="18" charset="0"/>
+                      </a:rPr>
+                      <m:t>∆</m:t>
+                    </m:r>
+                    <m:r>
+                      <a:rPr lang="it-IT" sz="3600" b="0" i="1" smtClean="0">
+                        <a:latin typeface="Cambria Math" panose="02040503050406030204" pitchFamily="18" charset="0"/>
+                        <a:ea typeface="Cambria Math" panose="02040503050406030204" pitchFamily="18" charset="0"/>
+                      </a:rPr>
+                      <m:t>𝑡</m:t>
+                    </m:r>
+                    <m:r>
+                      <a:rPr lang="it-IT" sz="3600" b="0" i="1" smtClean="0">
+                        <a:latin typeface="Cambria Math" panose="02040503050406030204" pitchFamily="18" charset="0"/>
+                        <a:ea typeface="Cambria Math" panose="02040503050406030204" pitchFamily="18" charset="0"/>
+                      </a:rPr>
+                      <m:t> </m:t>
+                    </m:r>
+                  </m:oMath>
+                </a14:m>
+                <a:r>
+                  <a:rPr lang="it-IT" sz="3600" dirty="0"/>
+                  <a:t>for </a:t>
+                </a:r>
+                <a:r>
+                  <a:rPr lang="it-IT" sz="3600" dirty="0" err="1"/>
+                  <a:t>different</a:t>
+                </a:r>
+                <a:r>
+                  <a:rPr lang="it-IT" sz="3600" dirty="0"/>
+                  <a:t> meshes</a:t>
+                </a:r>
+                <a:endParaRPr lang="en-GB" sz="3600" dirty="0"/>
+              </a:p>
+            </p:txBody>
+          </p:sp>
+        </mc:Choice>
+        <mc:Fallback>
+          <p:sp>
+            <p:nvSpPr>
+              <p:cNvPr id="8" name="CasellaDiTesto 7">
+                <a:extLst>
+                  <a:ext uri="{FF2B5EF4-FFF2-40B4-BE49-F238E27FC236}">
+                    <a16:creationId xmlns:a16="http://schemas.microsoft.com/office/drawing/2014/main" id="{46BF0F23-5451-B192-5993-4E046627416A}"/>
+                  </a:ext>
+                </a:extLst>
+              </p:cNvPr>
+              <p:cNvSpPr txBox="1">
+                <a:spLocks noRot="1" noChangeAspect="1" noMove="1" noResize="1" noEditPoints="1" noAdjustHandles="1" noChangeArrowheads="1" noChangeShapeType="1" noTextEdit="1"/>
+              </p:cNvSpPr>
+              <p:nvPr/>
+            </p:nvSpPr>
+            <p:spPr>
+              <a:xfrm>
+                <a:off x="1589103" y="470517"/>
+                <a:ext cx="8549195" cy="646331"/>
+              </a:xfrm>
+              <a:prstGeom prst="rect">
+                <a:avLst/>
+              </a:prstGeom>
+              <a:blipFill>
+                <a:blip r:embed="rId2"/>
+                <a:stretch>
+                  <a:fillRect l="-2211" t="-14151" b="-34906"/>
+                </a:stretch>
+              </a:blipFill>
+            </p:spPr>
+            <p:txBody>
+              <a:bodyPr/>
+              <a:lstStyle/>
+              <a:p>
+                <a:r>
+                  <a:rPr lang="en-GB">
+                    <a:noFill/>
+                  </a:rPr>
+                  <a:t> </a:t>
+                </a:r>
+              </a:p>
+            </p:txBody>
+          </p:sp>
+        </mc:Fallback>
+      </mc:AlternateContent>
+    </p:spTree>
+    <p:extLst>
+      <p:ext uri="{BB962C8B-B14F-4D97-AF65-F5344CB8AC3E}">
+        <p14:creationId xmlns:p14="http://schemas.microsoft.com/office/powerpoint/2010/main" val="477503311"/>
+      </p:ext>
+    </p:extLst>
+  </p:cSld>
+  <p:clrMapOvr>
+    <a:masterClrMapping/>
+  </p:clrMapOvr>
+</p:sld>
+</file>
+
+<file path=ppt/slides/slide16.xml><?xml version="1.0" encoding="utf-8"?>
+<p:sld xmlns:a="http://schemas.openxmlformats.org/drawingml/2006/main" xmlns:r="http://schemas.openxmlformats.org/officeDocument/2006/relationships" xmlns:p="http://schemas.openxmlformats.org/presentationml/2006/main">
+  <p:cSld>
+    <p:spTree>
+      <p:nvGrpSpPr>
+        <p:cNvPr id="1" name=""/>
+        <p:cNvGrpSpPr/>
+        <p:nvPr/>
+      </p:nvGrpSpPr>
+      <p:grpSpPr>
+        <a:xfrm>
+          <a:off x="0" y="0"/>
+          <a:ext cx="0" cy="0"/>
+          <a:chOff x="0" y="0"/>
+          <a:chExt cx="0" cy="0"/>
+        </a:xfrm>
+      </p:grpSpPr>
+      <p:sp>
+        <p:nvSpPr>
+          <p:cNvPr id="4" name="Segnaposto data 3">
+            <a:extLst>
+              <a:ext uri="{FF2B5EF4-FFF2-40B4-BE49-F238E27FC236}">
+                <a16:creationId xmlns:a16="http://schemas.microsoft.com/office/drawing/2014/main" id="{E9BC23B6-B2F6-2F74-23C1-00521837CD40}"/>
+              </a:ext>
+            </a:extLst>
+          </p:cNvPr>
+          <p:cNvSpPr>
+            <a:spLocks noGrp="1"/>
+          </p:cNvSpPr>
+          <p:nvPr>
+            <p:ph type="dt" sz="half" idx="10"/>
+          </p:nvPr>
+        </p:nvSpPr>
+        <p:spPr/>
+        <p:txBody>
+          <a:bodyPr/>
+          <a:lstStyle/>
+          <a:p>
+            <a:pPr rtl="0"/>
+            <a:r>
+              <a:rPr lang="en-GB" noProof="0"/>
+              <a:t>20XX</a:t>
+            </a:r>
+          </a:p>
+        </p:txBody>
+      </p:sp>
+      <p:sp>
+        <p:nvSpPr>
+          <p:cNvPr id="5" name="Segnaposto piè di pagina 4">
+            <a:extLst>
+              <a:ext uri="{FF2B5EF4-FFF2-40B4-BE49-F238E27FC236}">
+                <a16:creationId xmlns:a16="http://schemas.microsoft.com/office/drawing/2014/main" id="{26AF7B2B-7D3E-AD92-414E-8F674A550BED}"/>
+              </a:ext>
+            </a:extLst>
+          </p:cNvPr>
+          <p:cNvSpPr>
+            <a:spLocks noGrp="1"/>
+          </p:cNvSpPr>
+          <p:nvPr>
+            <p:ph type="ftr" sz="quarter" idx="11"/>
+          </p:nvPr>
+        </p:nvSpPr>
+        <p:spPr/>
+        <p:txBody>
+          <a:bodyPr/>
+          <a:lstStyle/>
+          <a:p>
+            <a:pPr rtl="0"/>
+            <a:r>
+              <a:rPr lang="en-GB" noProof="0"/>
+              <a:t>Pitch Deck</a:t>
+            </a:r>
+          </a:p>
+        </p:txBody>
+      </p:sp>
+      <p:sp>
+        <p:nvSpPr>
+          <p:cNvPr id="6" name="Segnaposto numero diapositiva 5">
+            <a:extLst>
+              <a:ext uri="{FF2B5EF4-FFF2-40B4-BE49-F238E27FC236}">
+                <a16:creationId xmlns:a16="http://schemas.microsoft.com/office/drawing/2014/main" id="{88D78D6D-F2D2-9E4F-8C4D-9CE090D0D099}"/>
+              </a:ext>
+            </a:extLst>
+          </p:cNvPr>
+          <p:cNvSpPr>
+            <a:spLocks noGrp="1"/>
+          </p:cNvSpPr>
+          <p:nvPr>
+            <p:ph type="sldNum" sz="quarter" idx="12"/>
+          </p:nvPr>
+        </p:nvSpPr>
+        <p:spPr/>
+        <p:txBody>
+          <a:bodyPr/>
+          <a:lstStyle/>
+          <a:p>
+            <a:pPr rtl="0"/>
+            <a:fld id="{B5CEABB6-07DC-46E8-9B57-56EC44A396E5}" type="slidenum">
+              <a:rPr lang="en-GB" noProof="0" smtClean="0"/>
+              <a:t>16</a:t>
+            </a:fld>
+            <a:endParaRPr lang="en-GB" noProof="0"/>
+          </a:p>
+        </p:txBody>
+      </p:sp>
+      <p:sp>
+        <p:nvSpPr>
+          <p:cNvPr id="8" name="CasellaDiTesto 7">
+            <a:extLst>
+              <a:ext uri="{FF2B5EF4-FFF2-40B4-BE49-F238E27FC236}">
+                <a16:creationId xmlns:a16="http://schemas.microsoft.com/office/drawing/2014/main" id="{76F3ECC3-E38E-6ED9-CD1A-063C7E668F06}"/>
+              </a:ext>
+            </a:extLst>
+          </p:cNvPr>
+          <p:cNvSpPr txBox="1"/>
+          <p:nvPr/>
+        </p:nvSpPr>
+        <p:spPr>
+          <a:xfrm>
+            <a:off x="2318657" y="680906"/>
+            <a:ext cx="7108794" cy="646331"/>
+          </a:xfrm>
+          <a:prstGeom prst="rect">
+            <a:avLst/>
+          </a:prstGeom>
+          <a:noFill/>
+        </p:spPr>
+        <p:txBody>
+          <a:bodyPr wrap="square">
+            <a:spAutoFit/>
+          </a:bodyPr>
+          <a:lstStyle/>
+          <a:p>
+            <a:r>
+              <a:rPr lang="it-IT" sz="3600" dirty="0"/>
+              <a:t>Time PC vs time cluster</a:t>
+            </a:r>
+            <a:endParaRPr lang="en-GB" sz="3600" dirty="0"/>
+          </a:p>
+        </p:txBody>
+      </p:sp>
+    </p:spTree>
+    <p:extLst>
+      <p:ext uri="{BB962C8B-B14F-4D97-AF65-F5344CB8AC3E}">
+        <p14:creationId xmlns:p14="http://schemas.microsoft.com/office/powerpoint/2010/main" val="4109155230"/>
+      </p:ext>
+    </p:extLst>
+  </p:cSld>
+  <p:clrMapOvr>
+    <a:masterClrMapping/>
+  </p:clrMapOvr>
+</p:sld>
+</file>
+
+<file path=ppt/slides/slide17.xml><?xml version="1.0" encoding="utf-8"?>
+<p:sld xmlns:a="http://schemas.openxmlformats.org/drawingml/2006/main" xmlns:r="http://schemas.openxmlformats.org/officeDocument/2006/relationships" xmlns:p="http://schemas.openxmlformats.org/presentationml/2006/main">
+  <p:cSld>
+    <p:spTree>
+      <p:nvGrpSpPr>
+        <p:cNvPr id="1" name=""/>
+        <p:cNvGrpSpPr/>
+        <p:nvPr/>
+      </p:nvGrpSpPr>
+      <p:grpSpPr>
+        <a:xfrm>
+          <a:off x="0" y="0"/>
+          <a:ext cx="0" cy="0"/>
+          <a:chOff x="0" y="0"/>
+          <a:chExt cx="0" cy="0"/>
+        </a:xfrm>
+      </p:grpSpPr>
+      <p:sp>
+        <p:nvSpPr>
+          <p:cNvPr id="4" name="Segnaposto data 3">
+            <a:extLst>
+              <a:ext uri="{FF2B5EF4-FFF2-40B4-BE49-F238E27FC236}">
+                <a16:creationId xmlns:a16="http://schemas.microsoft.com/office/drawing/2014/main" id="{88601A50-C21D-FFDC-8C81-56C44B664418}"/>
+              </a:ext>
+            </a:extLst>
+          </p:cNvPr>
+          <p:cNvSpPr>
+            <a:spLocks noGrp="1"/>
+          </p:cNvSpPr>
+          <p:nvPr>
+            <p:ph type="dt" sz="half" idx="10"/>
+          </p:nvPr>
+        </p:nvSpPr>
+        <p:spPr/>
+        <p:txBody>
+          <a:bodyPr/>
+          <a:lstStyle/>
+          <a:p>
+            <a:pPr rtl="0"/>
+            <a:r>
+              <a:rPr lang="en-GB" noProof="0"/>
+              <a:t>20XX</a:t>
+            </a:r>
+          </a:p>
+        </p:txBody>
+      </p:sp>
+      <p:sp>
+        <p:nvSpPr>
+          <p:cNvPr id="5" name="Segnaposto piè di pagina 4">
+            <a:extLst>
+              <a:ext uri="{FF2B5EF4-FFF2-40B4-BE49-F238E27FC236}">
+                <a16:creationId xmlns:a16="http://schemas.microsoft.com/office/drawing/2014/main" id="{3D5701C5-8CD1-AF76-0A50-6B7DB4F0DFF6}"/>
+              </a:ext>
+            </a:extLst>
+          </p:cNvPr>
+          <p:cNvSpPr>
+            <a:spLocks noGrp="1"/>
+          </p:cNvSpPr>
+          <p:nvPr>
+            <p:ph type="ftr" sz="quarter" idx="11"/>
+          </p:nvPr>
+        </p:nvSpPr>
+        <p:spPr/>
+        <p:txBody>
+          <a:bodyPr/>
+          <a:lstStyle/>
+          <a:p>
+            <a:pPr rtl="0"/>
+            <a:r>
+              <a:rPr lang="en-GB" noProof="0"/>
+              <a:t>Pitch Deck</a:t>
+            </a:r>
+          </a:p>
+        </p:txBody>
+      </p:sp>
+      <p:sp>
+        <p:nvSpPr>
+          <p:cNvPr id="6" name="Segnaposto numero diapositiva 5">
+            <a:extLst>
+              <a:ext uri="{FF2B5EF4-FFF2-40B4-BE49-F238E27FC236}">
+                <a16:creationId xmlns:a16="http://schemas.microsoft.com/office/drawing/2014/main" id="{8DDEE7C3-F034-357E-CEEE-BDA834C92156}"/>
+              </a:ext>
+            </a:extLst>
+          </p:cNvPr>
+          <p:cNvSpPr>
+            <a:spLocks noGrp="1"/>
+          </p:cNvSpPr>
+          <p:nvPr>
+            <p:ph type="sldNum" sz="quarter" idx="12"/>
+          </p:nvPr>
+        </p:nvSpPr>
+        <p:spPr/>
+        <p:txBody>
+          <a:bodyPr/>
+          <a:lstStyle/>
+          <a:p>
+            <a:pPr rtl="0"/>
+            <a:fld id="{B5CEABB6-07DC-46E8-9B57-56EC44A396E5}" type="slidenum">
+              <a:rPr lang="en-GB" noProof="0" smtClean="0"/>
+              <a:t>17</a:t>
+            </a:fld>
+            <a:endParaRPr lang="en-GB" noProof="0"/>
+          </a:p>
+        </p:txBody>
+      </p:sp>
+      <p:sp>
+        <p:nvSpPr>
+          <p:cNvPr id="3" name="CasellaDiTesto 2">
+            <a:extLst>
+              <a:ext uri="{FF2B5EF4-FFF2-40B4-BE49-F238E27FC236}">
+                <a16:creationId xmlns:a16="http://schemas.microsoft.com/office/drawing/2014/main" id="{1CB31B4E-0808-7622-D32C-42BF027D5515}"/>
+              </a:ext>
+            </a:extLst>
+          </p:cNvPr>
+          <p:cNvSpPr txBox="1"/>
+          <p:nvPr/>
+        </p:nvSpPr>
+        <p:spPr>
+          <a:xfrm>
+            <a:off x="2734322" y="275207"/>
+            <a:ext cx="8282866" cy="646331"/>
+          </a:xfrm>
+          <a:prstGeom prst="rect">
+            <a:avLst/>
+          </a:prstGeom>
+          <a:noFill/>
+        </p:spPr>
+        <p:txBody>
+          <a:bodyPr wrap="square" rtlCol="0">
+            <a:spAutoFit/>
+          </a:bodyPr>
+          <a:lstStyle/>
+          <a:p>
+            <a:r>
+              <a:rPr lang="it-IT" sz="3600" dirty="0"/>
+              <a:t>DRAG AND LIFT COMPARISON</a:t>
+            </a:r>
+            <a:endParaRPr lang="en-GB" sz="3600" dirty="0"/>
+          </a:p>
+        </p:txBody>
+      </p:sp>
+      <p:pic>
+        <p:nvPicPr>
+          <p:cNvPr id="8" name="Immagine 7">
+            <a:extLst>
+              <a:ext uri="{FF2B5EF4-FFF2-40B4-BE49-F238E27FC236}">
+                <a16:creationId xmlns:a16="http://schemas.microsoft.com/office/drawing/2014/main" id="{D3A13932-5B52-446D-5C56-20888C217C63}"/>
+              </a:ext>
+            </a:extLst>
+          </p:cNvPr>
+          <p:cNvPicPr>
+            <a:picLocks noChangeAspect="1"/>
+          </p:cNvPicPr>
+          <p:nvPr/>
+        </p:nvPicPr>
+        <p:blipFill>
+          <a:blip r:embed="rId2"/>
+          <a:stretch>
+            <a:fillRect/>
+          </a:stretch>
+        </p:blipFill>
+        <p:spPr>
+          <a:xfrm>
+            <a:off x="6096000" y="1223454"/>
+            <a:ext cx="5881455" cy="4411092"/>
+          </a:xfrm>
+          <a:prstGeom prst="rect">
+            <a:avLst/>
+          </a:prstGeom>
+        </p:spPr>
+      </p:pic>
+      <p:pic>
+        <p:nvPicPr>
+          <p:cNvPr id="11" name="Immagine 10">
+            <a:extLst>
+              <a:ext uri="{FF2B5EF4-FFF2-40B4-BE49-F238E27FC236}">
+                <a16:creationId xmlns:a16="http://schemas.microsoft.com/office/drawing/2014/main" id="{F0F48BE3-19ED-E84B-0F8A-71778D88FDC9}"/>
+              </a:ext>
+            </a:extLst>
+          </p:cNvPr>
+          <p:cNvPicPr>
+            <a:picLocks noChangeAspect="1"/>
+          </p:cNvPicPr>
+          <p:nvPr/>
+        </p:nvPicPr>
+        <p:blipFill>
+          <a:blip r:embed="rId3"/>
+          <a:stretch>
+            <a:fillRect/>
+          </a:stretch>
+        </p:blipFill>
+        <p:spPr>
+          <a:xfrm>
+            <a:off x="148626" y="1223456"/>
+            <a:ext cx="5881455" cy="4411090"/>
+          </a:xfrm>
+          <a:prstGeom prst="rect">
+            <a:avLst/>
+          </a:prstGeom>
+        </p:spPr>
+      </p:pic>
     </p:spTree>
     <p:extLst>
       <p:ext uri="{BB962C8B-B14F-4D97-AF65-F5344CB8AC3E}">
         <p14:creationId xmlns:p14="http://schemas.microsoft.com/office/powerpoint/2010/main" val="504739512"/>
+      </p:ext>
+    </p:extLst>
+  </p:cSld>
+  <p:clrMapOvr>
+    <a:masterClrMapping/>
+  </p:clrMapOvr>
+</p:sld>
+</file>
+
+<file path=ppt/slides/slide18.xml><?xml version="1.0" encoding="utf-8"?>
+<p:sld xmlns:a="http://schemas.openxmlformats.org/drawingml/2006/main" xmlns:r="http://schemas.openxmlformats.org/officeDocument/2006/relationships" xmlns:p="http://schemas.openxmlformats.org/presentationml/2006/main">
+  <p:cSld>
+    <p:spTree>
+      <p:nvGrpSpPr>
+        <p:cNvPr id="1" name=""/>
+        <p:cNvGrpSpPr/>
+        <p:nvPr/>
+      </p:nvGrpSpPr>
+      <p:grpSpPr>
+        <a:xfrm>
+          <a:off x="0" y="0"/>
+          <a:ext cx="0" cy="0"/>
+          <a:chOff x="0" y="0"/>
+          <a:chExt cx="0" cy="0"/>
+        </a:xfrm>
+      </p:grpSpPr>
+      <p:sp>
+        <p:nvSpPr>
+          <p:cNvPr id="4" name="Segnaposto data 3">
+            <a:extLst>
+              <a:ext uri="{FF2B5EF4-FFF2-40B4-BE49-F238E27FC236}">
+                <a16:creationId xmlns:a16="http://schemas.microsoft.com/office/drawing/2014/main" id="{8DB416B5-0024-BBCA-A466-D8AB25EB5AB2}"/>
+              </a:ext>
+            </a:extLst>
+          </p:cNvPr>
+          <p:cNvSpPr>
+            <a:spLocks noGrp="1"/>
+          </p:cNvSpPr>
+          <p:nvPr>
+            <p:ph type="dt" sz="half" idx="10"/>
+          </p:nvPr>
+        </p:nvSpPr>
+        <p:spPr/>
+        <p:txBody>
+          <a:bodyPr/>
+          <a:lstStyle/>
+          <a:p>
+            <a:pPr rtl="0"/>
+            <a:r>
+              <a:rPr lang="en-GB" noProof="0"/>
+              <a:t>20XX</a:t>
+            </a:r>
+          </a:p>
+        </p:txBody>
+      </p:sp>
+      <p:sp>
+        <p:nvSpPr>
+          <p:cNvPr id="5" name="Segnaposto piè di pagina 4">
+            <a:extLst>
+              <a:ext uri="{FF2B5EF4-FFF2-40B4-BE49-F238E27FC236}">
+                <a16:creationId xmlns:a16="http://schemas.microsoft.com/office/drawing/2014/main" id="{894A66F2-A2B0-71A0-2F78-2CA707676B68}"/>
+              </a:ext>
+            </a:extLst>
+          </p:cNvPr>
+          <p:cNvSpPr>
+            <a:spLocks noGrp="1"/>
+          </p:cNvSpPr>
+          <p:nvPr>
+            <p:ph type="ftr" sz="quarter" idx="11"/>
+          </p:nvPr>
+        </p:nvSpPr>
+        <p:spPr/>
+        <p:txBody>
+          <a:bodyPr/>
+          <a:lstStyle/>
+          <a:p>
+            <a:pPr rtl="0"/>
+            <a:r>
+              <a:rPr lang="en-GB" noProof="0"/>
+              <a:t>Pitch Deck</a:t>
+            </a:r>
+          </a:p>
+        </p:txBody>
+      </p:sp>
+      <p:sp>
+        <p:nvSpPr>
+          <p:cNvPr id="6" name="Segnaposto numero diapositiva 5">
+            <a:extLst>
+              <a:ext uri="{FF2B5EF4-FFF2-40B4-BE49-F238E27FC236}">
+                <a16:creationId xmlns:a16="http://schemas.microsoft.com/office/drawing/2014/main" id="{5BAC0143-3ED4-E5BE-A7A0-A170C21AC11E}"/>
+              </a:ext>
+            </a:extLst>
+          </p:cNvPr>
+          <p:cNvSpPr>
+            <a:spLocks noGrp="1"/>
+          </p:cNvSpPr>
+          <p:nvPr>
+            <p:ph type="sldNum" sz="quarter" idx="12"/>
+          </p:nvPr>
+        </p:nvSpPr>
+        <p:spPr/>
+        <p:txBody>
+          <a:bodyPr/>
+          <a:lstStyle/>
+          <a:p>
+            <a:pPr rtl="0"/>
+            <a:fld id="{B5CEABB6-07DC-46E8-9B57-56EC44A396E5}" type="slidenum">
+              <a:rPr lang="en-GB" noProof="0" smtClean="0"/>
+              <a:t>18</a:t>
+            </a:fld>
+            <a:endParaRPr lang="en-GB" noProof="0"/>
+          </a:p>
+        </p:txBody>
+      </p:sp>
+      <p:pic>
+        <p:nvPicPr>
+          <p:cNvPr id="10" name="Immagine 9">
+            <a:extLst>
+              <a:ext uri="{FF2B5EF4-FFF2-40B4-BE49-F238E27FC236}">
+                <a16:creationId xmlns:a16="http://schemas.microsoft.com/office/drawing/2014/main" id="{8DA6A369-80B2-6109-91B7-5DE6B1472E34}"/>
+              </a:ext>
+            </a:extLst>
+          </p:cNvPr>
+          <p:cNvPicPr>
+            <a:picLocks noChangeAspect="1"/>
+          </p:cNvPicPr>
+          <p:nvPr/>
+        </p:nvPicPr>
+        <p:blipFill>
+          <a:blip r:embed="rId2"/>
+          <a:stretch>
+            <a:fillRect/>
+          </a:stretch>
+        </p:blipFill>
+        <p:spPr>
+          <a:xfrm>
+            <a:off x="554158" y="1287555"/>
+            <a:ext cx="5710520" cy="4282889"/>
+          </a:xfrm>
+          <a:prstGeom prst="rect">
+            <a:avLst/>
+          </a:prstGeom>
+        </p:spPr>
+      </p:pic>
+      <p:pic>
+        <p:nvPicPr>
+          <p:cNvPr id="11" name="Immagine 10">
+            <a:extLst>
+              <a:ext uri="{FF2B5EF4-FFF2-40B4-BE49-F238E27FC236}">
+                <a16:creationId xmlns:a16="http://schemas.microsoft.com/office/drawing/2014/main" id="{220B1472-E280-0FE0-E97D-93E99CD98B88}"/>
+              </a:ext>
+            </a:extLst>
+          </p:cNvPr>
+          <p:cNvPicPr>
+            <a:picLocks noChangeAspect="1"/>
+          </p:cNvPicPr>
+          <p:nvPr/>
+        </p:nvPicPr>
+        <p:blipFill>
+          <a:blip r:embed="rId3"/>
+          <a:stretch>
+            <a:fillRect/>
+          </a:stretch>
+        </p:blipFill>
+        <p:spPr>
+          <a:xfrm>
+            <a:off x="6264678" y="1287555"/>
+            <a:ext cx="5710520" cy="4282890"/>
+          </a:xfrm>
+          <a:prstGeom prst="rect">
+            <a:avLst/>
+          </a:prstGeom>
+        </p:spPr>
+      </p:pic>
+    </p:spTree>
+    <p:extLst>
+      <p:ext uri="{BB962C8B-B14F-4D97-AF65-F5344CB8AC3E}">
+        <p14:creationId xmlns:p14="http://schemas.microsoft.com/office/powerpoint/2010/main" val="1216487185"/>
+      </p:ext>
+    </p:extLst>
+  </p:cSld>
+  <p:clrMapOvr>
+    <a:masterClrMapping/>
+  </p:clrMapOvr>
+</p:sld>
+</file>
+
+<file path=ppt/slides/slide19.xml><?xml version="1.0" encoding="utf-8"?>
+<p:sld xmlns:a="http://schemas.openxmlformats.org/drawingml/2006/main" xmlns:r="http://schemas.openxmlformats.org/officeDocument/2006/relationships" xmlns:p="http://schemas.openxmlformats.org/presentationml/2006/main">
+  <p:cSld>
+    <p:spTree>
+      <p:nvGrpSpPr>
+        <p:cNvPr id="1" name=""/>
+        <p:cNvGrpSpPr/>
+        <p:nvPr/>
+      </p:nvGrpSpPr>
+      <p:grpSpPr>
+        <a:xfrm>
+          <a:off x="0" y="0"/>
+          <a:ext cx="0" cy="0"/>
+          <a:chOff x="0" y="0"/>
+          <a:chExt cx="0" cy="0"/>
+        </a:xfrm>
+      </p:grpSpPr>
+      <p:sp>
+        <p:nvSpPr>
+          <p:cNvPr id="4" name="Segnaposto data 3">
+            <a:extLst>
+              <a:ext uri="{FF2B5EF4-FFF2-40B4-BE49-F238E27FC236}">
+                <a16:creationId xmlns:a16="http://schemas.microsoft.com/office/drawing/2014/main" id="{7C26CD82-A5BD-C672-940C-DE95B7EC8B83}"/>
+              </a:ext>
+            </a:extLst>
+          </p:cNvPr>
+          <p:cNvSpPr>
+            <a:spLocks noGrp="1"/>
+          </p:cNvSpPr>
+          <p:nvPr>
+            <p:ph type="dt" sz="half" idx="10"/>
+          </p:nvPr>
+        </p:nvSpPr>
+        <p:spPr/>
+        <p:txBody>
+          <a:bodyPr/>
+          <a:lstStyle/>
+          <a:p>
+            <a:pPr rtl="0"/>
+            <a:r>
+              <a:rPr lang="en-GB" noProof="0"/>
+              <a:t>20XX</a:t>
+            </a:r>
+          </a:p>
+        </p:txBody>
+      </p:sp>
+      <p:sp>
+        <p:nvSpPr>
+          <p:cNvPr id="5" name="Segnaposto piè di pagina 4">
+            <a:extLst>
+              <a:ext uri="{FF2B5EF4-FFF2-40B4-BE49-F238E27FC236}">
+                <a16:creationId xmlns:a16="http://schemas.microsoft.com/office/drawing/2014/main" id="{75E214BE-916B-7156-536E-220AC3E5782F}"/>
+              </a:ext>
+            </a:extLst>
+          </p:cNvPr>
+          <p:cNvSpPr>
+            <a:spLocks noGrp="1"/>
+          </p:cNvSpPr>
+          <p:nvPr>
+            <p:ph type="ftr" sz="quarter" idx="11"/>
+          </p:nvPr>
+        </p:nvSpPr>
+        <p:spPr/>
+        <p:txBody>
+          <a:bodyPr/>
+          <a:lstStyle/>
+          <a:p>
+            <a:pPr rtl="0"/>
+            <a:r>
+              <a:rPr lang="en-GB" noProof="0"/>
+              <a:t>Pitch Deck</a:t>
+            </a:r>
+          </a:p>
+        </p:txBody>
+      </p:sp>
+      <p:sp>
+        <p:nvSpPr>
+          <p:cNvPr id="6" name="Segnaposto numero diapositiva 5">
+            <a:extLst>
+              <a:ext uri="{FF2B5EF4-FFF2-40B4-BE49-F238E27FC236}">
+                <a16:creationId xmlns:a16="http://schemas.microsoft.com/office/drawing/2014/main" id="{04727951-73A2-6CA1-08A4-7878D77C8B3D}"/>
+              </a:ext>
+            </a:extLst>
+          </p:cNvPr>
+          <p:cNvSpPr>
+            <a:spLocks noGrp="1"/>
+          </p:cNvSpPr>
+          <p:nvPr>
+            <p:ph type="sldNum" sz="quarter" idx="12"/>
+          </p:nvPr>
+        </p:nvSpPr>
+        <p:spPr/>
+        <p:txBody>
+          <a:bodyPr/>
+          <a:lstStyle/>
+          <a:p>
+            <a:pPr rtl="0"/>
+            <a:fld id="{B5CEABB6-07DC-46E8-9B57-56EC44A396E5}" type="slidenum">
+              <a:rPr lang="en-GB" noProof="0" smtClean="0"/>
+              <a:t>19</a:t>
+            </a:fld>
+            <a:endParaRPr lang="en-GB" noProof="0"/>
+          </a:p>
+        </p:txBody>
+      </p:sp>
+      <p:sp>
+        <p:nvSpPr>
+          <p:cNvPr id="7" name="CasellaDiTesto 6">
+            <a:extLst>
+              <a:ext uri="{FF2B5EF4-FFF2-40B4-BE49-F238E27FC236}">
+                <a16:creationId xmlns:a16="http://schemas.microsoft.com/office/drawing/2014/main" id="{33D829D2-4E51-4CCC-14DE-220C81E0B1AB}"/>
+              </a:ext>
+            </a:extLst>
+          </p:cNvPr>
+          <p:cNvSpPr txBox="1"/>
+          <p:nvPr/>
+        </p:nvSpPr>
+        <p:spPr>
+          <a:xfrm>
+            <a:off x="2734322" y="275207"/>
+            <a:ext cx="8282866" cy="646331"/>
+          </a:xfrm>
+          <a:prstGeom prst="rect">
+            <a:avLst/>
+          </a:prstGeom>
+          <a:noFill/>
+        </p:spPr>
+        <p:txBody>
+          <a:bodyPr wrap="square" rtlCol="0">
+            <a:spAutoFit/>
+          </a:bodyPr>
+          <a:lstStyle/>
+          <a:p>
+            <a:r>
+              <a:rPr lang="it-IT" sz="3600" dirty="0"/>
+              <a:t>PRECONDITIONERS</a:t>
+            </a:r>
+            <a:endParaRPr lang="en-GB" sz="3600" dirty="0"/>
+          </a:p>
+        </p:txBody>
+      </p:sp>
+    </p:spTree>
+    <p:extLst>
+      <p:ext uri="{BB962C8B-B14F-4D97-AF65-F5344CB8AC3E}">
+        <p14:creationId xmlns:p14="http://schemas.microsoft.com/office/powerpoint/2010/main" val="1033101100"/>
       </p:ext>
     </p:extLst>
   </p:cSld>
@@ -21160,6 +22153,160 @@
     <p:extLst>
       <p:ext uri="{BB962C8B-B14F-4D97-AF65-F5344CB8AC3E}">
         <p14:creationId xmlns:p14="http://schemas.microsoft.com/office/powerpoint/2010/main" val="2243494996"/>
+      </p:ext>
+    </p:extLst>
+  </p:cSld>
+  <p:clrMapOvr>
+    <a:masterClrMapping/>
+  </p:clrMapOvr>
+</p:sld>
+</file>
+
+<file path=ppt/slides/slide20.xml><?xml version="1.0" encoding="utf-8"?>
+<p:sld xmlns:a="http://schemas.openxmlformats.org/drawingml/2006/main" xmlns:r="http://schemas.openxmlformats.org/officeDocument/2006/relationships" xmlns:p="http://schemas.openxmlformats.org/presentationml/2006/main">
+  <p:cSld>
+    <p:spTree>
+      <p:nvGrpSpPr>
+        <p:cNvPr id="1" name=""/>
+        <p:cNvGrpSpPr/>
+        <p:nvPr/>
+      </p:nvGrpSpPr>
+      <p:grpSpPr>
+        <a:xfrm>
+          <a:off x="0" y="0"/>
+          <a:ext cx="0" cy="0"/>
+          <a:chOff x="0" y="0"/>
+          <a:chExt cx="0" cy="0"/>
+        </a:xfrm>
+      </p:grpSpPr>
+      <p:sp>
+        <p:nvSpPr>
+          <p:cNvPr id="4" name="Segnaposto data 3">
+            <a:extLst>
+              <a:ext uri="{FF2B5EF4-FFF2-40B4-BE49-F238E27FC236}">
+                <a16:creationId xmlns:a16="http://schemas.microsoft.com/office/drawing/2014/main" id="{0234839C-BBCA-EC5F-710E-D2F8D7106230}"/>
+              </a:ext>
+            </a:extLst>
+          </p:cNvPr>
+          <p:cNvSpPr>
+            <a:spLocks noGrp="1"/>
+          </p:cNvSpPr>
+          <p:nvPr>
+            <p:ph type="dt" sz="half" idx="10"/>
+          </p:nvPr>
+        </p:nvSpPr>
+        <p:spPr/>
+        <p:txBody>
+          <a:bodyPr/>
+          <a:lstStyle/>
+          <a:p>
+            <a:pPr rtl="0"/>
+            <a:r>
+              <a:rPr lang="en-GB" noProof="0"/>
+              <a:t>20XX</a:t>
+            </a:r>
+          </a:p>
+        </p:txBody>
+      </p:sp>
+      <p:sp>
+        <p:nvSpPr>
+          <p:cNvPr id="5" name="Segnaposto piè di pagina 4">
+            <a:extLst>
+              <a:ext uri="{FF2B5EF4-FFF2-40B4-BE49-F238E27FC236}">
+                <a16:creationId xmlns:a16="http://schemas.microsoft.com/office/drawing/2014/main" id="{293F79F3-6BC8-55DD-820B-51629BB93EBA}"/>
+              </a:ext>
+            </a:extLst>
+          </p:cNvPr>
+          <p:cNvSpPr>
+            <a:spLocks noGrp="1"/>
+          </p:cNvSpPr>
+          <p:nvPr>
+            <p:ph type="ftr" sz="quarter" idx="11"/>
+          </p:nvPr>
+        </p:nvSpPr>
+        <p:spPr/>
+        <p:txBody>
+          <a:bodyPr/>
+          <a:lstStyle/>
+          <a:p>
+            <a:pPr rtl="0"/>
+            <a:r>
+              <a:rPr lang="en-GB" noProof="0"/>
+              <a:t>Pitch Deck</a:t>
+            </a:r>
+          </a:p>
+        </p:txBody>
+      </p:sp>
+      <p:sp>
+        <p:nvSpPr>
+          <p:cNvPr id="6" name="Segnaposto numero diapositiva 5">
+            <a:extLst>
+              <a:ext uri="{FF2B5EF4-FFF2-40B4-BE49-F238E27FC236}">
+                <a16:creationId xmlns:a16="http://schemas.microsoft.com/office/drawing/2014/main" id="{F2A72FC6-0CFA-2315-D8F7-E4D1C5CB9789}"/>
+              </a:ext>
+            </a:extLst>
+          </p:cNvPr>
+          <p:cNvSpPr>
+            <a:spLocks noGrp="1"/>
+          </p:cNvSpPr>
+          <p:nvPr>
+            <p:ph type="sldNum" sz="quarter" idx="12"/>
+          </p:nvPr>
+        </p:nvSpPr>
+        <p:spPr/>
+        <p:txBody>
+          <a:bodyPr/>
+          <a:lstStyle/>
+          <a:p>
+            <a:pPr rtl="0"/>
+            <a:fld id="{B5CEABB6-07DC-46E8-9B57-56EC44A396E5}" type="slidenum">
+              <a:rPr lang="en-GB" noProof="0" smtClean="0"/>
+              <a:t>20</a:t>
+            </a:fld>
+            <a:endParaRPr lang="en-GB" noProof="0"/>
+          </a:p>
+        </p:txBody>
+      </p:sp>
+      <p:sp>
+        <p:nvSpPr>
+          <p:cNvPr id="7" name="CasellaDiTesto 6">
+            <a:extLst>
+              <a:ext uri="{FF2B5EF4-FFF2-40B4-BE49-F238E27FC236}">
+                <a16:creationId xmlns:a16="http://schemas.microsoft.com/office/drawing/2014/main" id="{87F52A84-1BE9-B6BE-D035-5C75969FEE01}"/>
+              </a:ext>
+            </a:extLst>
+          </p:cNvPr>
+          <p:cNvSpPr txBox="1"/>
+          <p:nvPr/>
+        </p:nvSpPr>
+        <p:spPr>
+          <a:xfrm>
+            <a:off x="2734322" y="275207"/>
+            <a:ext cx="8282866" cy="646331"/>
+          </a:xfrm>
+          <a:prstGeom prst="rect">
+            <a:avLst/>
+          </a:prstGeom>
+          <a:noFill/>
+        </p:spPr>
+        <p:txBody>
+          <a:bodyPr wrap="square" rtlCol="0">
+            <a:spAutoFit/>
+          </a:bodyPr>
+          <a:lstStyle/>
+          <a:p>
+            <a:r>
+              <a:rPr lang="it-IT" sz="3600" dirty="0"/>
+              <a:t>SKREW SYMMETRIC</a:t>
+            </a:r>
+            <a:endParaRPr lang="en-GB" sz="3600" dirty="0"/>
+          </a:p>
+        </p:txBody>
+      </p:sp>
+    </p:spTree>
+    <p:extLst>
+      <p:ext uri="{BB962C8B-B14F-4D97-AF65-F5344CB8AC3E}">
+        <p14:creationId xmlns:p14="http://schemas.microsoft.com/office/powerpoint/2010/main" val="343381631"/>
       </p:ext>
     </p:extLst>
   </p:cSld>
@@ -23321,8 +24468,8 @@
           </a:p>
         </p:txBody>
       </p:sp>
-      <mc:AlternateContent xmlns:mc="http://schemas.openxmlformats.org/markup-compatibility/2006">
-        <mc:Choice xmlns:a14="http://schemas.microsoft.com/office/drawing/2010/main" Requires="a14">
+      <mc:AlternateContent xmlns:mc="http://schemas.openxmlformats.org/markup-compatibility/2006" xmlns:a14="http://schemas.microsoft.com/office/drawing/2010/main">
+        <mc:Choice Requires="a14">
           <p:sp>
             <p:nvSpPr>
               <p:cNvPr id="8" name="CasellaDiTesto 7">
@@ -23695,7 +24842,7 @@
             </p:txBody>
           </p:sp>
         </mc:Choice>
-        <mc:Fallback>
+        <mc:Fallback xmlns="">
           <p:sp>
             <p:nvSpPr>
               <p:cNvPr id="8" name="CasellaDiTesto 7">
@@ -23983,6 +25130,782 @@
           </a:p>
         </p:txBody>
       </p:sp>
+      <mc:AlternateContent xmlns:mc="http://schemas.openxmlformats.org/markup-compatibility/2006">
+        <mc:Choice xmlns:a14="http://schemas.microsoft.com/office/drawing/2010/main" Requires="a14">
+          <p:sp>
+            <p:nvSpPr>
+              <p:cNvPr id="2" name="CasellaDiTesto 1">
+                <a:extLst>
+                  <a:ext uri="{FF2B5EF4-FFF2-40B4-BE49-F238E27FC236}">
+                    <a16:creationId xmlns:a16="http://schemas.microsoft.com/office/drawing/2014/main" id="{82890B8F-BFB7-F971-F782-B91438FE3CE7}"/>
+                  </a:ext>
+                </a:extLst>
+              </p:cNvPr>
+              <p:cNvSpPr txBox="1"/>
+              <p:nvPr/>
+            </p:nvSpPr>
+            <p:spPr>
+              <a:xfrm>
+                <a:off x="1731146" y="2024109"/>
+                <a:ext cx="5705215" cy="338554"/>
+              </a:xfrm>
+              <a:prstGeom prst="rect">
+                <a:avLst/>
+              </a:prstGeom>
+              <a:noFill/>
+            </p:spPr>
+            <p:txBody>
+              <a:bodyPr wrap="none" lIns="0" tIns="0" rIns="0" bIns="0" rtlCol="0">
+                <a:spAutoFit/>
+              </a:bodyPr>
+              <a:lstStyle/>
+              <a:p>
+                <a14:m>
+                  <m:oMathPara xmlns:m="http://schemas.openxmlformats.org/officeDocument/2006/math">
+                    <m:oMathParaPr>
+                      <m:jc m:val="centerGroup"/>
+                    </m:oMathParaPr>
+                    <m:oMath xmlns:m="http://schemas.openxmlformats.org/officeDocument/2006/math">
+                      <m:r>
+                        <a:rPr lang="it-IT" sz="2200" b="1" i="1" smtClean="0">
+                          <a:latin typeface="Cambria Math" panose="02040503050406030204" pitchFamily="18" charset="0"/>
+                        </a:rPr>
+                        <m:t>𝒖</m:t>
+                      </m:r>
+                      <m:r>
+                        <a:rPr lang="it-IT" sz="2200" b="0" i="1" smtClean="0">
+                          <a:latin typeface="Cambria Math" panose="02040503050406030204" pitchFamily="18" charset="0"/>
+                          <a:ea typeface="Cambria Math" panose="02040503050406030204" pitchFamily="18" charset="0"/>
+                        </a:rPr>
+                        <m:t>∙</m:t>
+                      </m:r>
+                      <m:r>
+                        <a:rPr lang="it-IT" sz="2200" b="1" i="1" smtClean="0">
+                          <a:latin typeface="Cambria Math" panose="02040503050406030204" pitchFamily="18" charset="0"/>
+                          <a:ea typeface="Cambria Math" panose="02040503050406030204" pitchFamily="18" charset="0"/>
+                        </a:rPr>
+                        <m:t>𝒏</m:t>
+                      </m:r>
+                      <m:r>
+                        <a:rPr lang="it-IT" sz="2200" b="0" i="1" smtClean="0">
+                          <a:latin typeface="Cambria Math" panose="02040503050406030204" pitchFamily="18" charset="0"/>
+                          <a:ea typeface="Cambria Math" panose="02040503050406030204" pitchFamily="18" charset="0"/>
+                        </a:rPr>
+                        <m:t>=</m:t>
+                      </m:r>
+                      <m:r>
+                        <a:rPr lang="it-IT" sz="2200" b="1" i="1" smtClean="0">
+                          <a:latin typeface="Cambria Math" panose="02040503050406030204" pitchFamily="18" charset="0"/>
+                          <a:ea typeface="Cambria Math" panose="02040503050406030204" pitchFamily="18" charset="0"/>
+                        </a:rPr>
+                        <m:t>𝟎</m:t>
+                      </m:r>
+                      <m:r>
+                        <a:rPr lang="it-IT" sz="2200" b="1" i="1" smtClean="0">
+                          <a:latin typeface="Cambria Math" panose="02040503050406030204" pitchFamily="18" charset="0"/>
+                          <a:ea typeface="Cambria Math" panose="02040503050406030204" pitchFamily="18" charset="0"/>
+                        </a:rPr>
+                        <m:t>                                    </m:t>
+                      </m:r>
+                      <m:r>
+                        <a:rPr lang="it-IT" sz="2200" b="0" i="1" smtClean="0">
+                          <a:latin typeface="Cambria Math" panose="02040503050406030204" pitchFamily="18" charset="0"/>
+                          <a:ea typeface="Cambria Math" panose="02040503050406030204" pitchFamily="18" charset="0"/>
+                        </a:rPr>
+                        <m:t>                    </m:t>
+                      </m:r>
+                      <m:r>
+                        <a:rPr lang="it-IT" sz="2200" b="0" i="1" smtClean="0">
+                          <a:latin typeface="Cambria Math" panose="02040503050406030204" pitchFamily="18" charset="0"/>
+                          <a:ea typeface="Cambria Math" panose="02040503050406030204" pitchFamily="18" charset="0"/>
+                        </a:rPr>
+                        <m:t>𝑜𝑛</m:t>
+                      </m:r>
+                      <m:r>
+                        <m:rPr>
+                          <m:nor/>
+                        </m:rPr>
+                        <a:rPr lang="it-IT" sz="2200" b="1" i="0" smtClean="0">
+                          <a:latin typeface="Cambria Math" panose="02040503050406030204" pitchFamily="18" charset="0"/>
+                          <a:ea typeface="Cambria Math" panose="02040503050406030204" pitchFamily="18" charset="0"/>
+                        </a:rPr>
+                        <m:t> </m:t>
+                      </m:r>
+                      <m:sSub>
+                        <m:sSubPr>
+                          <m:ctrlPr>
+                            <a:rPr lang="it-IT" sz="2200" b="1" i="1" smtClean="0">
+                              <a:latin typeface="Cambria Math" panose="02040503050406030204" pitchFamily="18" charset="0"/>
+                              <a:ea typeface="Cambria Math" panose="02040503050406030204" pitchFamily="18" charset="0"/>
+                            </a:rPr>
+                          </m:ctrlPr>
+                        </m:sSubPr>
+                        <m:e>
+                          <m:r>
+                            <m:rPr>
+                              <m:nor/>
+                            </m:rPr>
+                            <a:rPr lang="el-GR" sz="2200" b="1"/>
+                            <m:t>Γ</m:t>
+                          </m:r>
+                        </m:e>
+                        <m:sub>
+                          <m:r>
+                            <a:rPr lang="it-IT" sz="2200" b="1" i="1" smtClean="0">
+                              <a:latin typeface="Cambria Math" panose="02040503050406030204" pitchFamily="18" charset="0"/>
+                              <a:ea typeface="Cambria Math" panose="02040503050406030204" pitchFamily="18" charset="0"/>
+                            </a:rPr>
+                            <m:t>𝒘𝒂𝒍𝒍</m:t>
+                          </m:r>
+                        </m:sub>
+                      </m:sSub>
+                      <m:r>
+                        <m:rPr>
+                          <m:nor/>
+                        </m:rPr>
+                        <a:rPr lang="it-IT" sz="2200" b="1" i="0" smtClean="0"/>
+                        <m:t> </m:t>
+                      </m:r>
+                    </m:oMath>
+                  </m:oMathPara>
+                </a14:m>
+                <a:endParaRPr lang="en-GB" sz="2200" b="1" dirty="0"/>
+              </a:p>
+            </p:txBody>
+          </p:sp>
+        </mc:Choice>
+        <mc:Fallback>
+          <p:sp>
+            <p:nvSpPr>
+              <p:cNvPr id="2" name="CasellaDiTesto 1">
+                <a:extLst>
+                  <a:ext uri="{FF2B5EF4-FFF2-40B4-BE49-F238E27FC236}">
+                    <a16:creationId xmlns:a16="http://schemas.microsoft.com/office/drawing/2014/main" id="{82890B8F-BFB7-F971-F782-B91438FE3CE7}"/>
+                  </a:ext>
+                </a:extLst>
+              </p:cNvPr>
+              <p:cNvSpPr txBox="1">
+                <a:spLocks noRot="1" noChangeAspect="1" noMove="1" noResize="1" noEditPoints="1" noAdjustHandles="1" noChangeArrowheads="1" noChangeShapeType="1" noTextEdit="1"/>
+              </p:cNvSpPr>
+              <p:nvPr/>
+            </p:nvSpPr>
+            <p:spPr>
+              <a:xfrm>
+                <a:off x="1731146" y="2024109"/>
+                <a:ext cx="5705215" cy="338554"/>
+              </a:xfrm>
+              <a:prstGeom prst="rect">
+                <a:avLst/>
+              </a:prstGeom>
+              <a:blipFill>
+                <a:blip r:embed="rId2"/>
+                <a:stretch>
+                  <a:fillRect l="-214" b="-17857"/>
+                </a:stretch>
+              </a:blipFill>
+            </p:spPr>
+            <p:txBody>
+              <a:bodyPr/>
+              <a:lstStyle/>
+              <a:p>
+                <a:r>
+                  <a:rPr lang="en-GB">
+                    <a:noFill/>
+                  </a:rPr>
+                  <a:t> </a:t>
+                </a:r>
+              </a:p>
+            </p:txBody>
+          </p:sp>
+        </mc:Fallback>
+      </mc:AlternateContent>
+      <mc:AlternateContent xmlns:mc="http://schemas.openxmlformats.org/markup-compatibility/2006">
+        <mc:Choice xmlns:a14="http://schemas.microsoft.com/office/drawing/2010/main" Requires="a14">
+          <p:sp>
+            <p:nvSpPr>
+              <p:cNvPr id="3" name="CasellaDiTesto 2">
+                <a:extLst>
+                  <a:ext uri="{FF2B5EF4-FFF2-40B4-BE49-F238E27FC236}">
+                    <a16:creationId xmlns:a16="http://schemas.microsoft.com/office/drawing/2014/main" id="{D0F48AEB-ECD4-4B7D-B19D-F87FFBBF2832}"/>
+                  </a:ext>
+                </a:extLst>
+              </p:cNvPr>
+              <p:cNvSpPr txBox="1"/>
+              <p:nvPr/>
+            </p:nvSpPr>
+            <p:spPr>
+              <a:xfrm>
+                <a:off x="1731146" y="2743200"/>
+                <a:ext cx="5716437" cy="338554"/>
+              </a:xfrm>
+              <a:prstGeom prst="rect">
+                <a:avLst/>
+              </a:prstGeom>
+              <a:noFill/>
+            </p:spPr>
+            <p:txBody>
+              <a:bodyPr wrap="none" lIns="0" tIns="0" rIns="0" bIns="0" rtlCol="0">
+                <a:spAutoFit/>
+              </a:bodyPr>
+              <a:lstStyle/>
+              <a:p>
+                <a14:m>
+                  <m:oMath xmlns:m="http://schemas.openxmlformats.org/officeDocument/2006/math">
+                    <m:d>
+                      <m:dPr>
+                        <m:ctrlPr>
+                          <a:rPr lang="it-IT" sz="2200" b="0" i="1" smtClean="0">
+                            <a:latin typeface="Cambria Math" panose="02040503050406030204" pitchFamily="18" charset="0"/>
+                            <a:ea typeface="Cambria Math" panose="02040503050406030204" pitchFamily="18" charset="0"/>
+                          </a:rPr>
+                        </m:ctrlPr>
+                      </m:dPr>
+                      <m:e>
+                        <m:r>
+                          <a:rPr lang="it-IT" sz="2200" b="0" i="1" smtClean="0">
+                            <a:latin typeface="Cambria Math" panose="02040503050406030204" pitchFamily="18" charset="0"/>
+                            <a:ea typeface="Cambria Math" panose="02040503050406030204" pitchFamily="18" charset="0"/>
+                          </a:rPr>
+                          <m:t>𝜇</m:t>
+                        </m:r>
+                        <m:r>
+                          <m:rPr>
+                            <m:sty m:val="p"/>
+                          </m:rPr>
+                          <a:rPr lang="it-IT" sz="2200" b="0" i="1" smtClean="0">
+                            <a:latin typeface="Cambria Math" panose="02040503050406030204" pitchFamily="18" charset="0"/>
+                            <a:ea typeface="Cambria Math" panose="02040503050406030204" pitchFamily="18" charset="0"/>
+                          </a:rPr>
+                          <m:t>∇</m:t>
+                        </m:r>
+                        <m:r>
+                          <a:rPr lang="it-IT" sz="2200" b="1" i="1" smtClean="0">
+                            <a:latin typeface="Cambria Math" panose="02040503050406030204" pitchFamily="18" charset="0"/>
+                            <a:ea typeface="Cambria Math" panose="02040503050406030204" pitchFamily="18" charset="0"/>
+                          </a:rPr>
+                          <m:t>𝒖</m:t>
+                        </m:r>
+                        <m:r>
+                          <a:rPr lang="it-IT" sz="2200" b="1" i="1" smtClean="0">
+                            <a:latin typeface="Cambria Math" panose="02040503050406030204" pitchFamily="18" charset="0"/>
+                            <a:ea typeface="Cambria Math" panose="02040503050406030204" pitchFamily="18" charset="0"/>
+                          </a:rPr>
+                          <m:t> ∙</m:t>
+                        </m:r>
+                        <m:r>
+                          <a:rPr lang="it-IT" sz="2200" b="1" i="1" smtClean="0">
+                            <a:latin typeface="Cambria Math" panose="02040503050406030204" pitchFamily="18" charset="0"/>
+                            <a:ea typeface="Cambria Math" panose="02040503050406030204" pitchFamily="18" charset="0"/>
+                          </a:rPr>
+                          <m:t>𝒏</m:t>
+                        </m:r>
+                        <m:r>
+                          <a:rPr lang="it-IT" sz="2200" b="1" i="1" smtClean="0">
+                            <a:latin typeface="Cambria Math" panose="02040503050406030204" pitchFamily="18" charset="0"/>
+                            <a:ea typeface="Cambria Math" panose="02040503050406030204" pitchFamily="18" charset="0"/>
+                          </a:rPr>
+                          <m:t> </m:t>
+                        </m:r>
+                        <m:r>
+                          <a:rPr lang="it-IT" sz="2200" b="0" i="1" smtClean="0">
+                            <a:latin typeface="Cambria Math" panose="02040503050406030204" pitchFamily="18" charset="0"/>
+                            <a:ea typeface="Cambria Math" panose="02040503050406030204" pitchFamily="18" charset="0"/>
+                          </a:rPr>
+                          <m:t>−</m:t>
+                        </m:r>
+                        <m:r>
+                          <a:rPr lang="it-IT" sz="2200" b="0" i="1" smtClean="0">
+                            <a:latin typeface="Cambria Math" panose="02040503050406030204" pitchFamily="18" charset="0"/>
+                            <a:ea typeface="Cambria Math" panose="02040503050406030204" pitchFamily="18" charset="0"/>
+                          </a:rPr>
+                          <m:t>𝑝</m:t>
+                        </m:r>
+                        <m:r>
+                          <a:rPr lang="it-IT" sz="2200" b="1" i="1" smtClean="0">
+                            <a:latin typeface="Cambria Math" panose="02040503050406030204" pitchFamily="18" charset="0"/>
+                            <a:ea typeface="Cambria Math" panose="02040503050406030204" pitchFamily="18" charset="0"/>
+                          </a:rPr>
+                          <m:t>𝒏</m:t>
+                        </m:r>
+                      </m:e>
+                    </m:d>
+                    <m:r>
+                      <a:rPr lang="it-IT" sz="2200" b="0" i="1" smtClean="0">
+                        <a:latin typeface="Cambria Math" panose="02040503050406030204" pitchFamily="18" charset="0"/>
+                        <a:ea typeface="Cambria Math" panose="02040503050406030204" pitchFamily="18" charset="0"/>
+                      </a:rPr>
+                      <m:t>∙</m:t>
+                    </m:r>
+                    <m:r>
+                      <a:rPr lang="it-IT" sz="2200" b="1" i="1" smtClean="0">
+                        <a:latin typeface="Cambria Math" panose="02040503050406030204" pitchFamily="18" charset="0"/>
+                        <a:ea typeface="Cambria Math" panose="02040503050406030204" pitchFamily="18" charset="0"/>
+                      </a:rPr>
+                      <m:t>𝒕</m:t>
+                    </m:r>
+                    <m:r>
+                      <a:rPr lang="it-IT" sz="2200" b="0" i="1" smtClean="0">
+                        <a:latin typeface="Cambria Math" panose="02040503050406030204" pitchFamily="18" charset="0"/>
+                        <a:ea typeface="Cambria Math" panose="02040503050406030204" pitchFamily="18" charset="0"/>
+                      </a:rPr>
+                      <m:t>=0</m:t>
+                    </m:r>
+                  </m:oMath>
+                </a14:m>
+                <a:r>
+                  <a:rPr lang="en-GB" sz="2200" dirty="0"/>
+                  <a:t>		</a:t>
+                </a:r>
+                <a:r>
+                  <a:rPr lang="it-IT" sz="2200" dirty="0">
+                    <a:ea typeface="Cambria Math" panose="02040503050406030204" pitchFamily="18" charset="0"/>
+                  </a:rPr>
+                  <a:t> </a:t>
+                </a:r>
+                <a14:m>
+                  <m:oMath xmlns:m="http://schemas.openxmlformats.org/officeDocument/2006/math">
+                    <m:r>
+                      <a:rPr lang="it-IT" sz="2200" i="1">
+                        <a:latin typeface="Cambria Math" panose="02040503050406030204" pitchFamily="18" charset="0"/>
+                        <a:ea typeface="Cambria Math" panose="02040503050406030204" pitchFamily="18" charset="0"/>
+                      </a:rPr>
+                      <m:t>𝑜𝑛</m:t>
+                    </m:r>
+                    <m:r>
+                      <m:rPr>
+                        <m:nor/>
+                      </m:rPr>
+                      <a:rPr lang="it-IT" sz="2200" b="1">
+                        <a:latin typeface="Cambria Math" panose="02040503050406030204" pitchFamily="18" charset="0"/>
+                        <a:ea typeface="Cambria Math" panose="02040503050406030204" pitchFamily="18" charset="0"/>
+                      </a:rPr>
+                      <m:t> </m:t>
+                    </m:r>
+                    <m:sSub>
+                      <m:sSubPr>
+                        <m:ctrlPr>
+                          <a:rPr lang="it-IT" sz="2200" b="1" i="1">
+                            <a:latin typeface="Cambria Math" panose="02040503050406030204" pitchFamily="18" charset="0"/>
+                            <a:ea typeface="Cambria Math" panose="02040503050406030204" pitchFamily="18" charset="0"/>
+                          </a:rPr>
+                        </m:ctrlPr>
+                      </m:sSubPr>
+                      <m:e>
+                        <m:r>
+                          <m:rPr>
+                            <m:nor/>
+                          </m:rPr>
+                          <a:rPr lang="el-GR" sz="2200" b="1"/>
+                          <m:t>Γ</m:t>
+                        </m:r>
+                      </m:e>
+                      <m:sub>
+                        <m:r>
+                          <a:rPr lang="it-IT" sz="2200" b="1" i="1">
+                            <a:latin typeface="Cambria Math" panose="02040503050406030204" pitchFamily="18" charset="0"/>
+                            <a:ea typeface="Cambria Math" panose="02040503050406030204" pitchFamily="18" charset="0"/>
+                          </a:rPr>
+                          <m:t>𝒘𝒂𝒍𝒍</m:t>
+                        </m:r>
+                      </m:sub>
+                    </m:sSub>
+                    <m:r>
+                      <m:rPr>
+                        <m:nor/>
+                      </m:rPr>
+                      <a:rPr lang="it-IT" sz="2200" b="1"/>
+                      <m:t> </m:t>
+                    </m:r>
+                  </m:oMath>
+                </a14:m>
+                <a:endParaRPr lang="en-GB" sz="2200" dirty="0"/>
+              </a:p>
+            </p:txBody>
+          </p:sp>
+        </mc:Choice>
+        <mc:Fallback>
+          <p:sp>
+            <p:nvSpPr>
+              <p:cNvPr id="3" name="CasellaDiTesto 2">
+                <a:extLst>
+                  <a:ext uri="{FF2B5EF4-FFF2-40B4-BE49-F238E27FC236}">
+                    <a16:creationId xmlns:a16="http://schemas.microsoft.com/office/drawing/2014/main" id="{D0F48AEB-ECD4-4B7D-B19D-F87FFBBF2832}"/>
+                  </a:ext>
+                </a:extLst>
+              </p:cNvPr>
+              <p:cNvSpPr txBox="1">
+                <a:spLocks noRot="1" noChangeAspect="1" noMove="1" noResize="1" noEditPoints="1" noAdjustHandles="1" noChangeArrowheads="1" noChangeShapeType="1" noTextEdit="1"/>
+              </p:cNvSpPr>
+              <p:nvPr/>
+            </p:nvSpPr>
+            <p:spPr>
+              <a:xfrm>
+                <a:off x="1731146" y="2743200"/>
+                <a:ext cx="5716437" cy="338554"/>
+              </a:xfrm>
+              <a:prstGeom prst="rect">
+                <a:avLst/>
+              </a:prstGeom>
+              <a:blipFill>
+                <a:blip r:embed="rId3"/>
+                <a:stretch>
+                  <a:fillRect b="-25000"/>
+                </a:stretch>
+              </a:blipFill>
+            </p:spPr>
+            <p:txBody>
+              <a:bodyPr/>
+              <a:lstStyle/>
+              <a:p>
+                <a:r>
+                  <a:rPr lang="en-GB">
+                    <a:noFill/>
+                  </a:rPr>
+                  <a:t> </a:t>
+                </a:r>
+              </a:p>
+            </p:txBody>
+          </p:sp>
+        </mc:Fallback>
+      </mc:AlternateContent>
+      <mc:AlternateContent xmlns:mc="http://schemas.openxmlformats.org/markup-compatibility/2006">
+        <mc:Choice xmlns:a14="http://schemas.microsoft.com/office/drawing/2010/main" Requires="a14">
+          <p:sp>
+            <p:nvSpPr>
+              <p:cNvPr id="8" name="CasellaDiTesto 7">
+                <a:extLst>
+                  <a:ext uri="{FF2B5EF4-FFF2-40B4-BE49-F238E27FC236}">
+                    <a16:creationId xmlns:a16="http://schemas.microsoft.com/office/drawing/2014/main" id="{EBD234D5-A369-DB36-1874-5B554E79FA1B}"/>
+                  </a:ext>
+                </a:extLst>
+              </p:cNvPr>
+              <p:cNvSpPr txBox="1"/>
+              <p:nvPr/>
+            </p:nvSpPr>
+            <p:spPr>
+              <a:xfrm>
+                <a:off x="1615736" y="3502397"/>
+                <a:ext cx="5530104" cy="338554"/>
+              </a:xfrm>
+              <a:prstGeom prst="rect">
+                <a:avLst/>
+              </a:prstGeom>
+              <a:noFill/>
+            </p:spPr>
+            <p:txBody>
+              <a:bodyPr wrap="none" lIns="0" tIns="0" rIns="0" bIns="0" rtlCol="0">
+                <a:spAutoFit/>
+              </a:bodyPr>
+              <a:lstStyle/>
+              <a:p>
+                <a14:m>
+                  <m:oMathPara xmlns:m="http://schemas.openxmlformats.org/officeDocument/2006/math">
+                    <m:oMathParaPr>
+                      <m:jc m:val="centerGroup"/>
+                    </m:oMathParaPr>
+                    <m:oMath xmlns:m="http://schemas.openxmlformats.org/officeDocument/2006/math">
+                      <m:r>
+                        <a:rPr lang="it-IT" sz="2200" b="1" i="1" smtClean="0">
+                          <a:latin typeface="Cambria Math" panose="02040503050406030204" pitchFamily="18" charset="0"/>
+                        </a:rPr>
+                        <m:t>𝒖</m:t>
+                      </m:r>
+                      <m:r>
+                        <a:rPr lang="it-IT" sz="2200" b="0" i="1" smtClean="0">
+                          <a:latin typeface="Cambria Math" panose="02040503050406030204" pitchFamily="18" charset="0"/>
+                        </a:rPr>
+                        <m:t>=</m:t>
+                      </m:r>
+                      <m:r>
+                        <a:rPr lang="it-IT" sz="2200" b="1" i="1" smtClean="0">
+                          <a:latin typeface="Cambria Math" panose="02040503050406030204" pitchFamily="18" charset="0"/>
+                        </a:rPr>
+                        <m:t>𝟎</m:t>
+                      </m:r>
+                      <m:r>
+                        <a:rPr lang="it-IT" sz="2200" b="1" i="1" smtClean="0">
+                          <a:latin typeface="Cambria Math" panose="02040503050406030204" pitchFamily="18" charset="0"/>
+                        </a:rPr>
+                        <m:t>                                                               </m:t>
+                      </m:r>
+                      <m:r>
+                        <a:rPr lang="it-IT" sz="2200" i="1">
+                          <a:latin typeface="Cambria Math" panose="02040503050406030204" pitchFamily="18" charset="0"/>
+                          <a:ea typeface="Cambria Math" panose="02040503050406030204" pitchFamily="18" charset="0"/>
+                        </a:rPr>
+                        <m:t>𝑜𝑛</m:t>
+                      </m:r>
+                      <m:r>
+                        <m:rPr>
+                          <m:nor/>
+                        </m:rPr>
+                        <a:rPr lang="it-IT" sz="2200" b="1">
+                          <a:latin typeface="Cambria Math" panose="02040503050406030204" pitchFamily="18" charset="0"/>
+                          <a:ea typeface="Cambria Math" panose="02040503050406030204" pitchFamily="18" charset="0"/>
+                        </a:rPr>
+                        <m:t> </m:t>
+                      </m:r>
+                      <m:sSub>
+                        <m:sSubPr>
+                          <m:ctrlPr>
+                            <a:rPr lang="it-IT" sz="2200" b="1" i="1">
+                              <a:latin typeface="Cambria Math" panose="02040503050406030204" pitchFamily="18" charset="0"/>
+                              <a:ea typeface="Cambria Math" panose="02040503050406030204" pitchFamily="18" charset="0"/>
+                            </a:rPr>
+                          </m:ctrlPr>
+                        </m:sSubPr>
+                        <m:e>
+                          <m:r>
+                            <m:rPr>
+                              <m:nor/>
+                            </m:rPr>
+                            <a:rPr lang="el-GR" sz="2200" b="1"/>
+                            <m:t>Γ</m:t>
+                          </m:r>
+                        </m:e>
+                        <m:sub>
+                          <m:r>
+                            <a:rPr lang="it-IT" sz="2200" b="1" i="1" smtClean="0">
+                              <a:latin typeface="Cambria Math" panose="02040503050406030204" pitchFamily="18" charset="0"/>
+                            </a:rPr>
+                            <m:t>𝒄</m:t>
+                          </m:r>
+                        </m:sub>
+                      </m:sSub>
+                    </m:oMath>
+                  </m:oMathPara>
+                </a14:m>
+                <a:endParaRPr lang="en-GB" sz="2200" b="1" dirty="0"/>
+              </a:p>
+            </p:txBody>
+          </p:sp>
+        </mc:Choice>
+        <mc:Fallback>
+          <p:sp>
+            <p:nvSpPr>
+              <p:cNvPr id="8" name="CasellaDiTesto 7">
+                <a:extLst>
+                  <a:ext uri="{FF2B5EF4-FFF2-40B4-BE49-F238E27FC236}">
+                    <a16:creationId xmlns:a16="http://schemas.microsoft.com/office/drawing/2014/main" id="{EBD234D5-A369-DB36-1874-5B554E79FA1B}"/>
+                  </a:ext>
+                </a:extLst>
+              </p:cNvPr>
+              <p:cNvSpPr txBox="1">
+                <a:spLocks noRot="1" noChangeAspect="1" noMove="1" noResize="1" noEditPoints="1" noAdjustHandles="1" noChangeArrowheads="1" noChangeShapeType="1" noTextEdit="1"/>
+              </p:cNvSpPr>
+              <p:nvPr/>
+            </p:nvSpPr>
+            <p:spPr>
+              <a:xfrm>
+                <a:off x="1615736" y="3502397"/>
+                <a:ext cx="5530104" cy="338554"/>
+              </a:xfrm>
+              <a:prstGeom prst="rect">
+                <a:avLst/>
+              </a:prstGeom>
+              <a:blipFill>
+                <a:blip r:embed="rId4"/>
+                <a:stretch>
+                  <a:fillRect b="-12727"/>
+                </a:stretch>
+              </a:blipFill>
+            </p:spPr>
+            <p:txBody>
+              <a:bodyPr/>
+              <a:lstStyle/>
+              <a:p>
+                <a:r>
+                  <a:rPr lang="en-GB">
+                    <a:noFill/>
+                  </a:rPr>
+                  <a:t> </a:t>
+                </a:r>
+              </a:p>
+            </p:txBody>
+          </p:sp>
+        </mc:Fallback>
+      </mc:AlternateContent>
+      <mc:AlternateContent xmlns:mc="http://schemas.openxmlformats.org/markup-compatibility/2006">
+        <mc:Choice xmlns:a14="http://schemas.microsoft.com/office/drawing/2010/main" Requires="a14">
+          <p:sp>
+            <p:nvSpPr>
+              <p:cNvPr id="9" name="CasellaDiTesto 8">
+                <a:extLst>
+                  <a:ext uri="{FF2B5EF4-FFF2-40B4-BE49-F238E27FC236}">
+                    <a16:creationId xmlns:a16="http://schemas.microsoft.com/office/drawing/2014/main" id="{3061C276-D365-D0F4-10EE-D24925778904}"/>
+                  </a:ext>
+                </a:extLst>
+              </p:cNvPr>
+              <p:cNvSpPr txBox="1"/>
+              <p:nvPr/>
+            </p:nvSpPr>
+            <p:spPr>
+              <a:xfrm>
+                <a:off x="1719976" y="4160846"/>
+                <a:ext cx="5535425" cy="338554"/>
+              </a:xfrm>
+              <a:prstGeom prst="rect">
+                <a:avLst/>
+              </a:prstGeom>
+              <a:noFill/>
+            </p:spPr>
+            <p:txBody>
+              <a:bodyPr wrap="none" lIns="0" tIns="0" rIns="0" bIns="0" rtlCol="0">
+                <a:spAutoFit/>
+              </a:bodyPr>
+              <a:lstStyle/>
+              <a:p>
+                <a14:m>
+                  <m:oMathPara xmlns:m="http://schemas.openxmlformats.org/officeDocument/2006/math">
+                    <m:oMathParaPr>
+                      <m:jc m:val="centerGroup"/>
+                    </m:oMathParaPr>
+                    <m:oMath xmlns:m="http://schemas.openxmlformats.org/officeDocument/2006/math">
+                      <m:r>
+                        <a:rPr lang="it-IT" sz="2200" b="1" i="1" smtClean="0">
+                          <a:latin typeface="Cambria Math" panose="02040503050406030204" pitchFamily="18" charset="0"/>
+                        </a:rPr>
+                        <m:t>𝒖</m:t>
+                      </m:r>
+                      <m:r>
+                        <a:rPr lang="it-IT" sz="2200" b="0" i="1" smtClean="0">
+                          <a:latin typeface="Cambria Math" panose="02040503050406030204" pitchFamily="18" charset="0"/>
+                        </a:rPr>
+                        <m:t>=</m:t>
+                      </m:r>
+                      <m:sSub>
+                        <m:sSubPr>
+                          <m:ctrlPr>
+                            <a:rPr lang="en-GB" sz="2200" b="1" i="1" dirty="0" smtClean="0">
+                              <a:latin typeface="Cambria Math" panose="02040503050406030204" pitchFamily="18" charset="0"/>
+                            </a:rPr>
+                          </m:ctrlPr>
+                        </m:sSubPr>
+                        <m:e>
+                          <m:r>
+                            <a:rPr lang="it-IT" sz="2200" b="1" i="1" dirty="0" smtClean="0">
+                              <a:latin typeface="Cambria Math" panose="02040503050406030204" pitchFamily="18" charset="0"/>
+                            </a:rPr>
+                            <m:t>𝑼</m:t>
+                          </m:r>
+                        </m:e>
+                        <m:sub>
+                          <m:r>
+                            <a:rPr lang="it-IT" sz="2200" b="1" i="1" dirty="0" smtClean="0">
+                              <a:latin typeface="Cambria Math" panose="02040503050406030204" pitchFamily="18" charset="0"/>
+                            </a:rPr>
+                            <m:t>𝑰𝑵𝑳𝑬𝑻</m:t>
+                          </m:r>
+                        </m:sub>
+                      </m:sSub>
+                      <m:r>
+                        <a:rPr lang="it-IT" sz="2200" b="1" i="1" smtClean="0">
+                          <a:latin typeface="Cambria Math" panose="02040503050406030204" pitchFamily="18" charset="0"/>
+                        </a:rPr>
+                        <m:t>                                                    </m:t>
+                      </m:r>
+                      <m:r>
+                        <a:rPr lang="it-IT" sz="2200" b="0" i="1" smtClean="0">
+                          <a:latin typeface="Cambria Math" panose="02040503050406030204" pitchFamily="18" charset="0"/>
+                        </a:rPr>
+                        <m:t> </m:t>
+                      </m:r>
+                      <m:r>
+                        <a:rPr lang="it-IT" sz="2200" b="0" i="1" smtClean="0">
+                          <a:latin typeface="Cambria Math" panose="02040503050406030204" pitchFamily="18" charset="0"/>
+                        </a:rPr>
+                        <m:t>𝑜𝑛</m:t>
+                      </m:r>
+                      <m:r>
+                        <m:rPr>
+                          <m:nor/>
+                        </m:rPr>
+                        <a:rPr lang="it-IT" sz="2200" b="1">
+                          <a:latin typeface="Cambria Math" panose="02040503050406030204" pitchFamily="18" charset="0"/>
+                          <a:ea typeface="Cambria Math" panose="02040503050406030204" pitchFamily="18" charset="0"/>
+                        </a:rPr>
+                        <m:t> </m:t>
+                      </m:r>
+                      <m:sSub>
+                        <m:sSubPr>
+                          <m:ctrlPr>
+                            <a:rPr lang="it-IT" sz="2200" b="1" i="1">
+                              <a:latin typeface="Cambria Math" panose="02040503050406030204" pitchFamily="18" charset="0"/>
+                              <a:ea typeface="Cambria Math" panose="02040503050406030204" pitchFamily="18" charset="0"/>
+                            </a:rPr>
+                          </m:ctrlPr>
+                        </m:sSubPr>
+                        <m:e>
+                          <m:r>
+                            <m:rPr>
+                              <m:nor/>
+                            </m:rPr>
+                            <a:rPr lang="el-GR" sz="2200" b="1"/>
+                            <m:t>Γ</m:t>
+                          </m:r>
+                        </m:e>
+                        <m:sub>
+                          <m:r>
+                            <a:rPr lang="it-IT" sz="2200" b="1" i="1" smtClean="0">
+                              <a:latin typeface="Cambria Math" panose="02040503050406030204" pitchFamily="18" charset="0"/>
+                            </a:rPr>
+                            <m:t>𝑰𝑵</m:t>
+                          </m:r>
+                        </m:sub>
+                      </m:sSub>
+                    </m:oMath>
+                  </m:oMathPara>
+                </a14:m>
+                <a:endParaRPr lang="en-GB" sz="2200" b="1" dirty="0"/>
+              </a:p>
+            </p:txBody>
+          </p:sp>
+        </mc:Choice>
+        <mc:Fallback>
+          <p:sp>
+            <p:nvSpPr>
+              <p:cNvPr id="9" name="CasellaDiTesto 8">
+                <a:extLst>
+                  <a:ext uri="{FF2B5EF4-FFF2-40B4-BE49-F238E27FC236}">
+                    <a16:creationId xmlns:a16="http://schemas.microsoft.com/office/drawing/2014/main" id="{3061C276-D365-D0F4-10EE-D24925778904}"/>
+                  </a:ext>
+                </a:extLst>
+              </p:cNvPr>
+              <p:cNvSpPr txBox="1">
+                <a:spLocks noRot="1" noChangeAspect="1" noMove="1" noResize="1" noEditPoints="1" noAdjustHandles="1" noChangeArrowheads="1" noChangeShapeType="1" noTextEdit="1"/>
+              </p:cNvSpPr>
+              <p:nvPr/>
+            </p:nvSpPr>
+            <p:spPr>
+              <a:xfrm>
+                <a:off x="1719976" y="4160846"/>
+                <a:ext cx="5535425" cy="338554"/>
+              </a:xfrm>
+              <a:prstGeom prst="rect">
+                <a:avLst/>
+              </a:prstGeom>
+              <a:blipFill>
+                <a:blip r:embed="rId5"/>
+                <a:stretch>
+                  <a:fillRect l="-220" r="-110" b="-18182"/>
+                </a:stretch>
+              </a:blipFill>
+            </p:spPr>
+            <p:txBody>
+              <a:bodyPr/>
+              <a:lstStyle/>
+              <a:p>
+                <a:r>
+                  <a:rPr lang="en-GB">
+                    <a:noFill/>
+                  </a:rPr>
+                  <a:t> </a:t>
+                </a:r>
+              </a:p>
+            </p:txBody>
+          </p:sp>
+        </mc:Fallback>
+      </mc:AlternateContent>
     </p:spTree>
     <p:extLst>
       <p:ext uri="{BB962C8B-B14F-4D97-AF65-F5344CB8AC3E}">
@@ -24115,7 +26038,7 @@
         </p:nvSpPr>
         <p:spPr>
           <a:xfrm>
-            <a:off x="1059180" y="815819"/>
+            <a:off x="1008017" y="592092"/>
             <a:ext cx="8771137" cy="584775"/>
           </a:xfrm>
           <a:prstGeom prst="rect">
@@ -24151,7 +26074,7 @@
         </p:nvSpPr>
         <p:spPr>
           <a:xfrm>
-            <a:off x="1059180" y="1817130"/>
+            <a:off x="1008017" y="1817130"/>
             <a:ext cx="2621280" cy="369332"/>
           </a:xfrm>
           <a:prstGeom prst="rect">
@@ -24167,7 +26090,7 @@
           <a:p>
             <a:r>
               <a:rPr lang="it-IT" dirty="0"/>
-              <a:t>CONVECTION FORM</a:t>
+              <a:t>CONVECTIVE FORM</a:t>
             </a:r>
             <a:endParaRPr lang="en-GB" dirty="0"/>
           </a:p>
@@ -24327,8 +26250,8 @@
             </p:nvSpPr>
             <p:spPr>
               <a:xfrm>
-                <a:off x="1178305" y="4827458"/>
-                <a:ext cx="321242" cy="276999"/>
+                <a:off x="1120880" y="4651192"/>
+                <a:ext cx="1676485" cy="385170"/>
               </a:xfrm>
               <a:prstGeom prst="rect">
                 <a:avLst/>
@@ -24341,6 +26264,7 @@
               </a:bodyPr>
               <a:lstStyle/>
               <a:p>
+                <a:pPr/>
                 <a14:m>
                   <m:oMathPara xmlns:m="http://schemas.openxmlformats.org/officeDocument/2006/math">
                     <m:oMathParaPr>
@@ -24350,14 +26274,14 @@
                       <m:sSubSup>
                         <m:sSubSupPr>
                           <m:ctrlPr>
-                            <a:rPr lang="en-GB" i="1" smtClean="0">
+                            <a:rPr lang="en-GB" sz="2400" i="1" smtClean="0">
                               <a:latin typeface="Cambria Math" panose="02040503050406030204" pitchFamily="18" charset="0"/>
                             </a:rPr>
                           </m:ctrlPr>
                         </m:sSubSupPr>
                         <m:e>
                           <m:r>
-                            <a:rPr lang="it-IT" b="0" i="1" smtClean="0">
+                            <a:rPr lang="it-IT" sz="2400" b="0" i="1" smtClean="0">
                               <a:latin typeface="Cambria Math" panose="02040503050406030204" pitchFamily="18" charset="0"/>
                             </a:rPr>
                             <m:t>𝑢</m:t>
@@ -24365,7 +26289,7 @@
                         </m:e>
                         <m:sub>
                           <m:r>
-                            <a:rPr lang="it-IT" b="0" i="1" smtClean="0">
+                            <a:rPr lang="it-IT" sz="2400" b="0" i="1" smtClean="0">
                               <a:latin typeface="Cambria Math" panose="02040503050406030204" pitchFamily="18" charset="0"/>
                             </a:rPr>
                             <m:t>h</m:t>
@@ -24373,17 +26297,79 @@
                         </m:sub>
                         <m:sup>
                           <m:r>
-                            <a:rPr lang="it-IT" b="0" i="1" smtClean="0">
+                            <a:rPr lang="it-IT" sz="2400" b="0" i="1" smtClean="0">
                               <a:latin typeface="Cambria Math" panose="02040503050406030204" pitchFamily="18" charset="0"/>
                             </a:rPr>
                             <m:t>𝑛</m:t>
                           </m:r>
                         </m:sup>
                       </m:sSubSup>
+                      <m:r>
+                        <a:rPr lang="it-IT" sz="2400" b="0" i="1" smtClean="0">
+                          <a:latin typeface="Cambria Math" panose="02040503050406030204" pitchFamily="18" charset="0"/>
+                        </a:rPr>
+                        <m:t> </m:t>
+                      </m:r>
+                      <m:r>
+                        <a:rPr lang="it-IT" sz="2400" b="0" i="1" smtClean="0">
+                          <a:latin typeface="Cambria Math" panose="02040503050406030204" pitchFamily="18" charset="0"/>
+                          <a:ea typeface="Cambria Math" panose="02040503050406030204" pitchFamily="18" charset="0"/>
+                        </a:rPr>
+                        <m:t>∙  </m:t>
+                      </m:r>
+                      <m:r>
+                        <m:rPr>
+                          <m:sty m:val="p"/>
+                        </m:rPr>
+                        <a:rPr lang="it-IT" sz="2400" b="0" i="1" smtClean="0">
+                          <a:latin typeface="Cambria Math" panose="02040503050406030204" pitchFamily="18" charset="0"/>
+                          <a:ea typeface="Cambria Math" panose="02040503050406030204" pitchFamily="18" charset="0"/>
+                        </a:rPr>
+                        <m:t>∇</m:t>
+                      </m:r>
+                      <m:sSubSup>
+                        <m:sSubSupPr>
+                          <m:ctrlPr>
+                            <a:rPr lang="en-GB" sz="2400" i="1">
+                              <a:latin typeface="Cambria Math" panose="02040503050406030204" pitchFamily="18" charset="0"/>
+                            </a:rPr>
+                          </m:ctrlPr>
+                        </m:sSubSupPr>
+                        <m:e>
+                          <m:r>
+                            <a:rPr lang="it-IT" sz="2400" i="1">
+                              <a:latin typeface="Cambria Math" panose="02040503050406030204" pitchFamily="18" charset="0"/>
+                            </a:rPr>
+                            <m:t>𝑢</m:t>
+                          </m:r>
+                        </m:e>
+                        <m:sub>
+                          <m:r>
+                            <a:rPr lang="it-IT" sz="2400" i="1">
+                              <a:latin typeface="Cambria Math" panose="02040503050406030204" pitchFamily="18" charset="0"/>
+                            </a:rPr>
+                            <m:t>h</m:t>
+                          </m:r>
+                        </m:sub>
+                        <m:sup>
+                          <m:r>
+                            <a:rPr lang="it-IT" sz="2400" i="1">
+                              <a:latin typeface="Cambria Math" panose="02040503050406030204" pitchFamily="18" charset="0"/>
+                            </a:rPr>
+                            <m:t>𝑛</m:t>
+                          </m:r>
+                          <m:r>
+                            <a:rPr lang="it-IT" sz="2400" b="0" i="1" smtClean="0">
+                              <a:latin typeface="Cambria Math" panose="02040503050406030204" pitchFamily="18" charset="0"/>
+                            </a:rPr>
+                            <m:t>+1</m:t>
+                          </m:r>
+                        </m:sup>
+                      </m:sSubSup>
                     </m:oMath>
                   </m:oMathPara>
                 </a14:m>
-                <a:endParaRPr lang="en-GB" dirty="0"/>
+                <a:endParaRPr lang="en-GB" sz="2400" dirty="0"/>
               </a:p>
             </p:txBody>
           </p:sp>
@@ -24405,8 +26391,8 @@
             </p:nvSpPr>
             <p:spPr>
               <a:xfrm>
-                <a:off x="1178305" y="4827458"/>
-                <a:ext cx="321242" cy="276999"/>
+                <a:off x="1120880" y="4651192"/>
+                <a:ext cx="1676485" cy="385170"/>
               </a:xfrm>
               <a:prstGeom prst="rect">
                 <a:avLst/>
@@ -24414,7 +26400,7 @@
               <a:blipFill>
                 <a:blip r:embed="rId3"/>
                 <a:stretch>
-                  <a:fillRect l="-9434" r="-1887" b="-22222"/>
+                  <a:fillRect/>
                 </a:stretch>
               </a:blipFill>
             </p:spPr>
@@ -25712,6 +27698,34 @@
 </file>
 
 <file path=customXml/item1.xml><?xml version="1.0" encoding="utf-8"?>
+<p:properties xmlns:p="http://schemas.microsoft.com/office/2006/metadata/properties" xmlns:xsi="http://www.w3.org/2001/XMLSchema-instance" xmlns:pc="http://schemas.microsoft.com/office/infopath/2007/PartnerControls">
+  <documentManagement>
+    <_ip_UnifiedCompliancePolicyUIAction xmlns="http://schemas.microsoft.com/sharepoint/v3" xsi:nil="true"/>
+    <Image xmlns="71af3243-3dd4-4a8d-8c0d-dd76da1f02a5">
+      <Url xsi:nil="true"/>
+      <Description xsi:nil="true"/>
+    </Image>
+    <Status xmlns="71af3243-3dd4-4a8d-8c0d-dd76da1f02a5">Not started</Status>
+    <_ip_UnifiedCompliancePolicyProperties xmlns="http://schemas.microsoft.com/sharepoint/v3" xsi:nil="true"/>
+    <ImageTagsTaxHTField xmlns="71af3243-3dd4-4a8d-8c0d-dd76da1f02a5">
+      <Terms xmlns="http://schemas.microsoft.com/office/infopath/2007/PartnerControls"/>
+    </ImageTagsTaxHTField>
+    <TaxCatchAll xmlns="230e9df3-be65-4c73-a93b-d1236ebd677e"/>
+    <MediaServiceKeyPoints xmlns="71af3243-3dd4-4a8d-8c0d-dd76da1f02a5" xsi:nil="true"/>
+  </documentManagement>
+</p:properties>
+</file>
+
+<file path=customXml/item2.xml><?xml version="1.0" encoding="utf-8"?>
+<?mso-contentType ?>
+<FormTemplates xmlns="http://schemas.microsoft.com/sharepoint/v3/contenttype/forms">
+  <Display>DocumentLibraryForm</Display>
+  <Edit>DocumentLibraryForm</Edit>
+  <New>DocumentLibraryForm</New>
+</FormTemplates>
+</file>
+
+<file path=customXml/item3.xml><?xml version="1.0" encoding="utf-8"?>
 <ct:contentTypeSchema xmlns:ct="http://schemas.microsoft.com/office/2006/metadata/contentType" xmlns:ma="http://schemas.microsoft.com/office/2006/metadata/properties/metaAttributes" ct:_="" ma:_="" ma:contentTypeName="Document" ma:contentTypeID="0x01010079F111ED35F8CC479449609E8A0923A6" ma:contentTypeVersion="20" ma:contentTypeDescription="Create a new document." ma:contentTypeScope="" ma:versionID="1267097ee5f5874adfcc408041ae252e">
   <xsd:schema xmlns:xsd="http://www.w3.org/2001/XMLSchema" xmlns:xs="http://www.w3.org/2001/XMLSchema" xmlns:p="http://schemas.microsoft.com/office/2006/metadata/properties" xmlns:ns1="http://schemas.microsoft.com/sharepoint/v3" xmlns:ns2="71af3243-3dd4-4a8d-8c0d-dd76da1f02a5" xmlns:ns3="16c05727-aa75-4e4a-9b5f-8a80a1165891" xmlns:ns4="230e9df3-be65-4c73-a93b-d1236ebd677e" targetNamespace="http://schemas.microsoft.com/office/2006/metadata/properties" ma:root="true" ma:fieldsID="395891a93df65b14727750f2c06c306c" ns1:_="" ns2:_="" ns3:_="" ns4:_="">
     <xsd:import namespace="http://schemas.microsoft.com/sharepoint/v3"/>
@@ -25987,35 +28001,27 @@
 </ct:contentTypeSchema>
 </file>
 
-<file path=customXml/item2.xml><?xml version="1.0" encoding="utf-8"?>
-<?mso-contentType ?>
-<FormTemplates xmlns="http://schemas.microsoft.com/sharepoint/v3/contenttype/forms">
-  <Display>DocumentLibraryForm</Display>
-  <Edit>DocumentLibraryForm</Edit>
-  <New>DocumentLibraryForm</New>
-</FormTemplates>
+<file path=customXml/itemProps1.xml><?xml version="1.0" encoding="utf-8"?>
+<ds:datastoreItem xmlns:ds="http://schemas.openxmlformats.org/officeDocument/2006/customXml" ds:itemID="{7F97B18F-50BC-4F30-8373-93489E845F83}">
+  <ds:schemaRefs>
+    <ds:schemaRef ds:uri="http://schemas.microsoft.com/office/2006/metadata/properties"/>
+    <ds:schemaRef ds:uri="http://schemas.microsoft.com/office/infopath/2007/PartnerControls"/>
+    <ds:schemaRef ds:uri="http://schemas.microsoft.com/sharepoint/v3"/>
+    <ds:schemaRef ds:uri="71af3243-3dd4-4a8d-8c0d-dd76da1f02a5"/>
+    <ds:schemaRef ds:uri="230e9df3-be65-4c73-a93b-d1236ebd677e"/>
+  </ds:schemaRefs>
+</ds:datastoreItem>
 </file>
 
-<file path=customXml/item3.xml><?xml version="1.0" encoding="utf-8"?>
-<p:properties xmlns:p="http://schemas.microsoft.com/office/2006/metadata/properties" xmlns:xsi="http://www.w3.org/2001/XMLSchema-instance" xmlns:pc="http://schemas.microsoft.com/office/infopath/2007/PartnerControls">
-  <documentManagement>
-    <_ip_UnifiedCompliancePolicyUIAction xmlns="http://schemas.microsoft.com/sharepoint/v3" xsi:nil="true"/>
-    <Image xmlns="71af3243-3dd4-4a8d-8c0d-dd76da1f02a5">
-      <Url xsi:nil="true"/>
-      <Description xsi:nil="true"/>
-    </Image>
-    <Status xmlns="71af3243-3dd4-4a8d-8c0d-dd76da1f02a5">Not started</Status>
-    <_ip_UnifiedCompliancePolicyProperties xmlns="http://schemas.microsoft.com/sharepoint/v3" xsi:nil="true"/>
-    <ImageTagsTaxHTField xmlns="71af3243-3dd4-4a8d-8c0d-dd76da1f02a5">
-      <Terms xmlns="http://schemas.microsoft.com/office/infopath/2007/PartnerControls"/>
-    </ImageTagsTaxHTField>
-    <TaxCatchAll xmlns="230e9df3-be65-4c73-a93b-d1236ebd677e"/>
-    <MediaServiceKeyPoints xmlns="71af3243-3dd4-4a8d-8c0d-dd76da1f02a5" xsi:nil="true"/>
-  </documentManagement>
-</p:properties>
+<file path=customXml/itemProps2.xml><?xml version="1.0" encoding="utf-8"?>
+<ds:datastoreItem xmlns:ds="http://schemas.openxmlformats.org/officeDocument/2006/customXml" ds:itemID="{42BC90D6-94CF-42F7-AAC4-9CF6824C54D5}">
+  <ds:schemaRefs>
+    <ds:schemaRef ds:uri="http://schemas.microsoft.com/sharepoint/v3/contenttype/forms"/>
+  </ds:schemaRefs>
+</ds:datastoreItem>
 </file>
 
-<file path=customXml/itemProps1.xml><?xml version="1.0" encoding="utf-8"?>
+<file path=customXml/itemProps3.xml><?xml version="1.0" encoding="utf-8"?>
 <ds:datastoreItem xmlns:ds="http://schemas.openxmlformats.org/officeDocument/2006/customXml" ds:itemID="{64CF2EF3-001F-4BE9-81B3-86ECBBF9425F}">
   <ds:schemaRefs>
     <ds:schemaRef ds:uri="http://schemas.microsoft.com/office/2006/metadata/contentType"/>
@@ -26036,26 +28042,6 @@
 </ds:datastoreItem>
 </file>
 
-<file path=customXml/itemProps2.xml><?xml version="1.0" encoding="utf-8"?>
-<ds:datastoreItem xmlns:ds="http://schemas.openxmlformats.org/officeDocument/2006/customXml" ds:itemID="{42BC90D6-94CF-42F7-AAC4-9CF6824C54D5}">
-  <ds:schemaRefs>
-    <ds:schemaRef ds:uri="http://schemas.microsoft.com/sharepoint/v3/contenttype/forms"/>
-  </ds:schemaRefs>
-</ds:datastoreItem>
-</file>
-
-<file path=customXml/itemProps3.xml><?xml version="1.0" encoding="utf-8"?>
-<ds:datastoreItem xmlns:ds="http://schemas.openxmlformats.org/officeDocument/2006/customXml" ds:itemID="{7F97B18F-50BC-4F30-8373-93489E845F83}">
-  <ds:schemaRefs>
-    <ds:schemaRef ds:uri="http://schemas.microsoft.com/office/2006/metadata/properties"/>
-    <ds:schemaRef ds:uri="http://schemas.microsoft.com/office/infopath/2007/PartnerControls"/>
-    <ds:schemaRef ds:uri="http://schemas.microsoft.com/sharepoint/v3"/>
-    <ds:schemaRef ds:uri="71af3243-3dd4-4a8d-8c0d-dd76da1f02a5"/>
-    <ds:schemaRef ds:uri="230e9df3-be65-4c73-a93b-d1236ebd677e"/>
-  </ds:schemaRefs>
-</ds:datastoreItem>
-</file>
-
 <file path=docMetadata/LabelInfo.xml><?xml version="1.0" encoding="utf-8"?>
 <clbl:labelList xmlns:clbl="http://schemas.microsoft.com/office/2020/mipLabelMetadata">
   <clbl:label id="{f42aa342-8706-4288-bd11-ebb85995028c}" enabled="1" method="Standard" siteId="{72f988bf-86f1-41af-91ab-2d7cd011db47}" removed="0"/>

</xml_diff>